<commit_message>
ya termine la presentacion
</commit_message>
<xml_diff>
--- a/ProyectoIBim/Jueguito.pptx
+++ b/ProyectoIBim/Jueguito.pptx
@@ -8,7 +8,13 @@
     <p:sldId id="256" r:id="rId2"/>
     <p:sldId id="257" r:id="rId3"/>
     <p:sldId id="259" r:id="rId4"/>
-    <p:sldId id="258" r:id="rId5"/>
+    <p:sldId id="260" r:id="rId5"/>
+    <p:sldId id="263" r:id="rId6"/>
+    <p:sldId id="265" r:id="rId7"/>
+    <p:sldId id="264" r:id="rId8"/>
+    <p:sldId id="262" r:id="rId9"/>
+    <p:sldId id="261" r:id="rId10"/>
+    <p:sldId id="258" r:id="rId11"/>
   </p:sldIdLst>
   <p:sldSz cx="12192000" cy="6858000"/>
   <p:notesSz cx="6858000" cy="9144000"/>
@@ -107,7 +113,16 @@
       </a:defRPr>
     </a:lvl9pPr>
   </p:defaultTextStyle>
+  <p:extLst>
+    <p:ext uri="{EFAFB233-063F-42B5-8137-9DF3F51BA10A}">
+      <p15:sldGuideLst xmlns:p15="http://schemas.microsoft.com/office/powerpoint/2012/main"/>
+    </p:ext>
+  </p:extLst>
 </p:presentation>
+</file>
+
+<file path=ppt/revisionInfo.xml><?xml version="1.0" encoding="utf-8"?>
+<p1510:revInfo xmlns:a="http://schemas.openxmlformats.org/drawingml/2006/main" xmlns:r="http://schemas.openxmlformats.org/officeDocument/2006/relationships" xmlns:p1510="http://schemas.microsoft.com/office/powerpoint/2015/10/main"/>
 </file>
 
 <file path=ppt/slideLayouts/slideLayout1.xml><?xml version="1.0" encoding="utf-8"?>
@@ -313,7 +328,7 @@
             <a:fld id="{B61BEF0D-F0BB-DE4B-95CE-6DB70DBA9567}" type="datetimeFigureOut">
               <a:rPr lang="en-US" dirty="0"/>
               <a:pPr/>
-              <a:t>12/3/2017</a:t>
+              <a:t>12/4/2017</a:t>
             </a:fld>
             <a:endParaRPr lang="en-US" dirty="0"/>
           </a:p>
@@ -601,7 +616,7 @@
             <a:fld id="{B61BEF0D-F0BB-DE4B-95CE-6DB70DBA9567}" type="datetimeFigureOut">
               <a:rPr lang="en-US" dirty="0"/>
               <a:pPr/>
-              <a:t>12/3/2017</a:t>
+              <a:t>12/4/2017</a:t>
             </a:fld>
             <a:endParaRPr lang="en-US" dirty="0"/>
           </a:p>
@@ -846,7 +861,7 @@
             <a:fld id="{B61BEF0D-F0BB-DE4B-95CE-6DB70DBA9567}" type="datetimeFigureOut">
               <a:rPr lang="en-US" dirty="0"/>
               <a:pPr/>
-              <a:t>12/3/2017</a:t>
+              <a:t>12/4/2017</a:t>
             </a:fld>
             <a:endParaRPr lang="en-US" dirty="0"/>
           </a:p>
@@ -1379,7 +1394,7 @@
             <a:fld id="{B61BEF0D-F0BB-DE4B-95CE-6DB70DBA9567}" type="datetimeFigureOut">
               <a:rPr lang="en-US" dirty="0"/>
               <a:pPr/>
-              <a:t>12/3/2017</a:t>
+              <a:t>12/4/2017</a:t>
             </a:fld>
             <a:endParaRPr lang="en-US" dirty="0"/>
           </a:p>
@@ -1624,7 +1639,7 @@
             <a:fld id="{B61BEF0D-F0BB-DE4B-95CE-6DB70DBA9567}" type="datetimeFigureOut">
               <a:rPr lang="en-US" dirty="0"/>
               <a:pPr/>
-              <a:t>12/3/2017</a:t>
+              <a:t>12/4/2017</a:t>
             </a:fld>
             <a:endParaRPr lang="en-US" dirty="0"/>
           </a:p>
@@ -2164,7 +2179,7 @@
             <a:fld id="{B61BEF0D-F0BB-DE4B-95CE-6DB70DBA9567}" type="datetimeFigureOut">
               <a:rPr lang="en-US" dirty="0"/>
               <a:pPr/>
-              <a:t>12/3/2017</a:t>
+              <a:t>12/4/2017</a:t>
             </a:fld>
             <a:endParaRPr lang="en-US" dirty="0"/>
           </a:p>
@@ -2471,7 +2486,7 @@
             <a:fld id="{B61BEF0D-F0BB-DE4B-95CE-6DB70DBA9567}" type="datetimeFigureOut">
               <a:rPr lang="en-US" dirty="0"/>
               <a:pPr/>
-              <a:t>12/3/2017</a:t>
+              <a:t>12/4/2017</a:t>
             </a:fld>
             <a:endParaRPr lang="en-US" dirty="0"/>
           </a:p>
@@ -2643,7 +2658,7 @@
             <a:fld id="{B61BEF0D-F0BB-DE4B-95CE-6DB70DBA9567}" type="datetimeFigureOut">
               <a:rPr lang="en-US" dirty="0"/>
               <a:pPr/>
-              <a:t>12/3/2017</a:t>
+              <a:t>12/4/2017</a:t>
             </a:fld>
             <a:endParaRPr lang="en-US" dirty="0"/>
           </a:p>
@@ -2820,7 +2835,7 @@
             <a:fld id="{B61BEF0D-F0BB-DE4B-95CE-6DB70DBA9567}" type="datetimeFigureOut">
               <a:rPr lang="en-US" dirty="0"/>
               <a:pPr/>
-              <a:t>12/3/2017</a:t>
+              <a:t>12/4/2017</a:t>
             </a:fld>
             <a:endParaRPr lang="en-US" dirty="0"/>
           </a:p>
@@ -2987,7 +3002,7 @@
             <a:fld id="{B61BEF0D-F0BB-DE4B-95CE-6DB70DBA9567}" type="datetimeFigureOut">
               <a:rPr lang="en-US" dirty="0"/>
               <a:pPr/>
-              <a:t>12/3/2017</a:t>
+              <a:t>12/4/2017</a:t>
             </a:fld>
             <a:endParaRPr lang="en-US" dirty="0"/>
           </a:p>
@@ -3230,7 +3245,7 @@
             <a:fld id="{B61BEF0D-F0BB-DE4B-95CE-6DB70DBA9567}" type="datetimeFigureOut">
               <a:rPr lang="en-US" dirty="0"/>
               <a:pPr/>
-              <a:t>12/3/2017</a:t>
+              <a:t>12/4/2017</a:t>
             </a:fld>
             <a:endParaRPr lang="en-US" dirty="0"/>
           </a:p>
@@ -3519,7 +3534,7 @@
             <a:fld id="{B61BEF0D-F0BB-DE4B-95CE-6DB70DBA9567}" type="datetimeFigureOut">
               <a:rPr lang="en-US" dirty="0"/>
               <a:pPr/>
-              <a:t>12/3/2017</a:t>
+              <a:t>12/4/2017</a:t>
             </a:fld>
             <a:endParaRPr lang="en-US" dirty="0"/>
           </a:p>
@@ -3946,7 +3961,7 @@
             <a:fld id="{B61BEF0D-F0BB-DE4B-95CE-6DB70DBA9567}" type="datetimeFigureOut">
               <a:rPr lang="en-US" dirty="0"/>
               <a:pPr/>
-              <a:t>12/3/2017</a:t>
+              <a:t>12/4/2017</a:t>
             </a:fld>
             <a:endParaRPr lang="en-US" dirty="0"/>
           </a:p>
@@ -4066,7 +4081,7 @@
             <a:fld id="{B61BEF0D-F0BB-DE4B-95CE-6DB70DBA9567}" type="datetimeFigureOut">
               <a:rPr lang="en-US" dirty="0"/>
               <a:pPr/>
-              <a:t>12/3/2017</a:t>
+              <a:t>12/4/2017</a:t>
             </a:fld>
             <a:endParaRPr lang="en-US" dirty="0"/>
           </a:p>
@@ -4158,7 +4173,7 @@
             <a:fld id="{B61BEF0D-F0BB-DE4B-95CE-6DB70DBA9567}" type="datetimeFigureOut">
               <a:rPr lang="en-US" dirty="0"/>
               <a:pPr/>
-              <a:t>12/3/2017</a:t>
+              <a:t>12/4/2017</a:t>
             </a:fld>
             <a:endParaRPr lang="en-US" dirty="0"/>
           </a:p>
@@ -4438,7 +4453,7 @@
             <a:fld id="{B61BEF0D-F0BB-DE4B-95CE-6DB70DBA9567}" type="datetimeFigureOut">
               <a:rPr lang="en-US" dirty="0"/>
               <a:pPr/>
-              <a:t>12/3/2017</a:t>
+              <a:t>12/4/2017</a:t>
             </a:fld>
             <a:endParaRPr lang="en-US" dirty="0"/>
           </a:p>
@@ -4726,7 +4741,7 @@
             <a:fld id="{B61BEF0D-F0BB-DE4B-95CE-6DB70DBA9567}" type="datetimeFigureOut">
               <a:rPr lang="en-US" dirty="0"/>
               <a:pPr/>
-              <a:t>12/3/2017</a:t>
+              <a:t>12/4/2017</a:t>
             </a:fld>
             <a:endParaRPr lang="en-US" dirty="0"/>
           </a:p>
@@ -4954,7 +4969,7 @@
             <a:fld id="{B61BEF0D-F0BB-DE4B-95CE-6DB70DBA9567}" type="datetimeFigureOut">
               <a:rPr lang="en-US" dirty="0"/>
               <a:pPr/>
-              <a:t>12/3/2017</a:t>
+              <a:t>12/4/2017</a:t>
             </a:fld>
             <a:endParaRPr lang="en-US" dirty="0"/>
           </a:p>
@@ -5700,232 +5715,7 @@
 </p:sld>
 </file>
 
-<file path=ppt/slides/slide2.xml><?xml version="1.0" encoding="utf-8"?>
-<p:sld xmlns:a="http://schemas.openxmlformats.org/drawingml/2006/main" xmlns:r="http://schemas.openxmlformats.org/officeDocument/2006/relationships" xmlns:p="http://schemas.openxmlformats.org/presentationml/2006/main">
-  <p:cSld>
-    <p:spTree>
-      <p:nvGrpSpPr>
-        <p:cNvPr id="1" name=""/>
-        <p:cNvGrpSpPr/>
-        <p:nvPr/>
-      </p:nvGrpSpPr>
-      <p:grpSpPr>
-        <a:xfrm>
-          <a:off x="0" y="0"/>
-          <a:ext cx="0" cy="0"/>
-          <a:chOff x="0" y="0"/>
-          <a:chExt cx="0" cy="0"/>
-        </a:xfrm>
-      </p:grpSpPr>
-      <p:sp>
-        <p:nvSpPr>
-          <p:cNvPr id="2" name="Título 1">
-            <a:extLst>
-              <a:ext uri="{FF2B5EF4-FFF2-40B4-BE49-F238E27FC236}">
-                <a16:creationId xmlns:a16="http://schemas.microsoft.com/office/drawing/2014/main" id="{4101E54B-EB61-4D90-B5ED-6524B6552D50}"/>
-              </a:ext>
-            </a:extLst>
-          </p:cNvPr>
-          <p:cNvSpPr>
-            <a:spLocks noGrp="1"/>
-          </p:cNvSpPr>
-          <p:nvPr>
-            <p:ph type="title"/>
-          </p:nvPr>
-        </p:nvSpPr>
-        <p:spPr/>
-        <p:txBody>
-          <a:bodyPr/>
-          <a:lstStyle/>
-          <a:p>
-            <a:r>
-              <a:rPr lang="es-EC" dirty="0"/>
-              <a:t>Introducción</a:t>
-            </a:r>
-            <a:r>
-              <a:rPr lang="en-US" dirty="0"/>
-              <a:t> </a:t>
-            </a:r>
-            <a:endParaRPr lang="es-EC" dirty="0"/>
-          </a:p>
-        </p:txBody>
-      </p:sp>
-      <p:sp>
-        <p:nvSpPr>
-          <p:cNvPr id="3" name="Marcador de contenido 2">
-            <a:extLst>
-              <a:ext uri="{FF2B5EF4-FFF2-40B4-BE49-F238E27FC236}">
-                <a16:creationId xmlns:a16="http://schemas.microsoft.com/office/drawing/2014/main" id="{4C7A1215-433A-41AB-9E26-8748BCD91B15}"/>
-              </a:ext>
-            </a:extLst>
-          </p:cNvPr>
-          <p:cNvSpPr>
-            <a:spLocks noGrp="1"/>
-          </p:cNvSpPr>
-          <p:nvPr>
-            <p:ph idx="1"/>
-          </p:nvPr>
-        </p:nvSpPr>
-        <p:spPr/>
-        <p:txBody>
-          <a:bodyPr/>
-          <a:lstStyle/>
-          <a:p>
-            <a:r>
-              <a:rPr lang="es-EC" dirty="0">
-                <a:effectLst/>
-              </a:rPr>
-              <a:t>HTML5 supone una verdadera revolución, en lo que a desarrollo de aplicaciones web se refiere. </a:t>
-            </a:r>
-          </a:p>
-          <a:p>
-            <a:r>
-              <a:rPr lang="es-EC" dirty="0">
-                <a:effectLst/>
-              </a:rPr>
-              <a:t>Sus nuevas características abren un inmenso abanico de posibilidades que nos permiten hacer verdaderas “diabluras”. </a:t>
-            </a:r>
-          </a:p>
-          <a:p>
-            <a:r>
-              <a:rPr lang="es-EC" dirty="0">
-                <a:effectLst/>
-              </a:rPr>
-              <a:t>Intentaremos hacer un jueguito entretenido con el potencial de HTML5 y Javascript</a:t>
-            </a:r>
-            <a:endParaRPr lang="es-EC" dirty="0"/>
-          </a:p>
-        </p:txBody>
-      </p:sp>
-    </p:spTree>
-    <p:extLst>
-      <p:ext uri="{BB962C8B-B14F-4D97-AF65-F5344CB8AC3E}">
-        <p14:creationId xmlns:p14="http://schemas.microsoft.com/office/powerpoint/2010/main" val="2335640616"/>
-      </p:ext>
-    </p:extLst>
-  </p:cSld>
-  <p:clrMapOvr>
-    <a:masterClrMapping/>
-  </p:clrMapOvr>
-</p:sld>
-</file>
-
-<file path=ppt/slides/slide3.xml><?xml version="1.0" encoding="utf-8"?>
-<p:sld xmlns:a="http://schemas.openxmlformats.org/drawingml/2006/main" xmlns:r="http://schemas.openxmlformats.org/officeDocument/2006/relationships" xmlns:p="http://schemas.openxmlformats.org/presentationml/2006/main">
-  <p:cSld>
-    <p:spTree>
-      <p:nvGrpSpPr>
-        <p:cNvPr id="1" name=""/>
-        <p:cNvGrpSpPr/>
-        <p:nvPr/>
-      </p:nvGrpSpPr>
-      <p:grpSpPr>
-        <a:xfrm>
-          <a:off x="0" y="0"/>
-          <a:ext cx="0" cy="0"/>
-          <a:chOff x="0" y="0"/>
-          <a:chExt cx="0" cy="0"/>
-        </a:xfrm>
-      </p:grpSpPr>
-      <p:sp>
-        <p:nvSpPr>
-          <p:cNvPr id="2" name="Título 1">
-            <a:extLst>
-              <a:ext uri="{FF2B5EF4-FFF2-40B4-BE49-F238E27FC236}">
-                <a16:creationId xmlns:a16="http://schemas.microsoft.com/office/drawing/2014/main" id="{0637D0E6-B3AB-40C0-8F05-8CFB5C59E36D}"/>
-              </a:ext>
-            </a:extLst>
-          </p:cNvPr>
-          <p:cNvSpPr>
-            <a:spLocks noGrp="1"/>
-          </p:cNvSpPr>
-          <p:nvPr>
-            <p:ph type="title"/>
-          </p:nvPr>
-        </p:nvSpPr>
-        <p:spPr/>
-        <p:txBody>
-          <a:bodyPr/>
-          <a:lstStyle/>
-          <a:p>
-            <a:r>
-              <a:rPr lang="es-EC" dirty="0">
-                <a:effectLst/>
-              </a:rPr>
-              <a:t>Representando a los avatares</a:t>
-            </a:r>
-            <a:endParaRPr lang="es-EC" dirty="0"/>
-          </a:p>
-        </p:txBody>
-      </p:sp>
-      <p:sp>
-        <p:nvSpPr>
-          <p:cNvPr id="4" name="Marcador de contenido 3">
-            <a:extLst>
-              <a:ext uri="{FF2B5EF4-FFF2-40B4-BE49-F238E27FC236}">
-                <a16:creationId xmlns:a16="http://schemas.microsoft.com/office/drawing/2014/main" id="{B000A8BB-6C17-4446-BD24-6E7FAD37EFAB}"/>
-              </a:ext>
-            </a:extLst>
-          </p:cNvPr>
-          <p:cNvSpPr>
-            <a:spLocks noGrp="1"/>
-          </p:cNvSpPr>
-          <p:nvPr>
-            <p:ph sz="half" idx="1"/>
-          </p:nvPr>
-        </p:nvSpPr>
-        <p:spPr/>
-        <p:txBody>
-          <a:bodyPr>
-            <a:normAutofit/>
-          </a:bodyPr>
-          <a:lstStyle/>
-          <a:p>
-            <a:endParaRPr lang="es-EC" dirty="0"/>
-          </a:p>
-        </p:txBody>
-      </p:sp>
-      <p:sp>
-        <p:nvSpPr>
-          <p:cNvPr id="5" name="Marcador de contenido 4">
-            <a:extLst>
-              <a:ext uri="{FF2B5EF4-FFF2-40B4-BE49-F238E27FC236}">
-                <a16:creationId xmlns:a16="http://schemas.microsoft.com/office/drawing/2014/main" id="{2EABC62D-0247-4B98-9B05-F94B354E78BE}"/>
-              </a:ext>
-            </a:extLst>
-          </p:cNvPr>
-          <p:cNvSpPr>
-            <a:spLocks noGrp="1"/>
-          </p:cNvSpPr>
-          <p:nvPr>
-            <p:ph sz="half" idx="2"/>
-          </p:nvPr>
-        </p:nvSpPr>
-        <p:spPr/>
-        <p:txBody>
-          <a:bodyPr>
-            <a:normAutofit/>
-          </a:bodyPr>
-          <a:lstStyle/>
-          <a:p>
-            <a:endParaRPr lang="es-EC"/>
-          </a:p>
-        </p:txBody>
-      </p:sp>
-    </p:spTree>
-    <p:extLst>
-      <p:ext uri="{BB962C8B-B14F-4D97-AF65-F5344CB8AC3E}">
-        <p14:creationId xmlns:p14="http://schemas.microsoft.com/office/powerpoint/2010/main" val="1972886553"/>
-      </p:ext>
-    </p:extLst>
-  </p:cSld>
-  <p:clrMapOvr>
-    <a:masterClrMapping/>
-  </p:clrMapOvr>
-</p:sld>
-</file>
-
-<file path=ppt/slides/slide4.xml><?xml version="1.0" encoding="utf-8"?>
+<file path=ppt/slides/slide10.xml><?xml version="1.0" encoding="utf-8"?>
 <p:sld xmlns:a="http://schemas.openxmlformats.org/drawingml/2006/main" xmlns:r="http://schemas.openxmlformats.org/officeDocument/2006/relationships" xmlns:p="http://schemas.openxmlformats.org/presentationml/2006/main">
   <p:cSld>
     <p:spTree>
@@ -6050,6 +5840,2655 @@
     <p:extLst>
       <p:ext uri="{BB962C8B-B14F-4D97-AF65-F5344CB8AC3E}">
         <p14:creationId xmlns:p14="http://schemas.microsoft.com/office/powerpoint/2010/main" val="1490899834"/>
+      </p:ext>
+    </p:extLst>
+  </p:cSld>
+  <p:clrMapOvr>
+    <a:masterClrMapping/>
+  </p:clrMapOvr>
+</p:sld>
+</file>
+
+<file path=ppt/slides/slide2.xml><?xml version="1.0" encoding="utf-8"?>
+<p:sld xmlns:a="http://schemas.openxmlformats.org/drawingml/2006/main" xmlns:r="http://schemas.openxmlformats.org/officeDocument/2006/relationships" xmlns:p="http://schemas.openxmlformats.org/presentationml/2006/main">
+  <p:cSld>
+    <p:spTree>
+      <p:nvGrpSpPr>
+        <p:cNvPr id="1" name=""/>
+        <p:cNvGrpSpPr/>
+        <p:nvPr/>
+      </p:nvGrpSpPr>
+      <p:grpSpPr>
+        <a:xfrm>
+          <a:off x="0" y="0"/>
+          <a:ext cx="0" cy="0"/>
+          <a:chOff x="0" y="0"/>
+          <a:chExt cx="0" cy="0"/>
+        </a:xfrm>
+      </p:grpSpPr>
+      <p:sp>
+        <p:nvSpPr>
+          <p:cNvPr id="2" name="Título 1">
+            <a:extLst>
+              <a:ext uri="{FF2B5EF4-FFF2-40B4-BE49-F238E27FC236}">
+                <a16:creationId xmlns:a16="http://schemas.microsoft.com/office/drawing/2014/main" id="{4101E54B-EB61-4D90-B5ED-6524B6552D50}"/>
+              </a:ext>
+            </a:extLst>
+          </p:cNvPr>
+          <p:cNvSpPr>
+            <a:spLocks noGrp="1"/>
+          </p:cNvSpPr>
+          <p:nvPr>
+            <p:ph type="title"/>
+          </p:nvPr>
+        </p:nvSpPr>
+        <p:spPr/>
+        <p:txBody>
+          <a:bodyPr/>
+          <a:lstStyle/>
+          <a:p>
+            <a:r>
+              <a:rPr lang="es-EC" dirty="0"/>
+              <a:t>Introducción</a:t>
+            </a:r>
+            <a:r>
+              <a:rPr lang="en-US" dirty="0"/>
+              <a:t> </a:t>
+            </a:r>
+            <a:endParaRPr lang="es-EC" dirty="0"/>
+          </a:p>
+        </p:txBody>
+      </p:sp>
+      <p:sp>
+        <p:nvSpPr>
+          <p:cNvPr id="3" name="Marcador de contenido 2">
+            <a:extLst>
+              <a:ext uri="{FF2B5EF4-FFF2-40B4-BE49-F238E27FC236}">
+                <a16:creationId xmlns:a16="http://schemas.microsoft.com/office/drawing/2014/main" id="{4C7A1215-433A-41AB-9E26-8748BCD91B15}"/>
+              </a:ext>
+            </a:extLst>
+          </p:cNvPr>
+          <p:cNvSpPr>
+            <a:spLocks noGrp="1"/>
+          </p:cNvSpPr>
+          <p:nvPr>
+            <p:ph idx="1"/>
+          </p:nvPr>
+        </p:nvSpPr>
+        <p:spPr/>
+        <p:txBody>
+          <a:bodyPr/>
+          <a:lstStyle/>
+          <a:p>
+            <a:r>
+              <a:rPr lang="es-EC" dirty="0">
+                <a:effectLst/>
+              </a:rPr>
+              <a:t>HTML5 supone una verdadera revolución, en lo que a desarrollo de aplicaciones web se refiere. </a:t>
+            </a:r>
+          </a:p>
+          <a:p>
+            <a:r>
+              <a:rPr lang="es-EC" dirty="0">
+                <a:effectLst/>
+              </a:rPr>
+              <a:t>Sus nuevas características abren un inmenso abanico de posibilidades que nos permiten hacer verdaderas “diabluras”. </a:t>
+            </a:r>
+          </a:p>
+          <a:p>
+            <a:r>
+              <a:rPr lang="es-EC" dirty="0">
+                <a:effectLst/>
+              </a:rPr>
+              <a:t>Intentaremos hacer un jueguito entretenido con el potencial de HTML5 y Javascript</a:t>
+            </a:r>
+            <a:endParaRPr lang="es-EC" dirty="0"/>
+          </a:p>
+        </p:txBody>
+      </p:sp>
+    </p:spTree>
+    <p:extLst>
+      <p:ext uri="{BB962C8B-B14F-4D97-AF65-F5344CB8AC3E}">
+        <p14:creationId xmlns:p14="http://schemas.microsoft.com/office/powerpoint/2010/main" val="2335640616"/>
+      </p:ext>
+    </p:extLst>
+  </p:cSld>
+  <p:clrMapOvr>
+    <a:masterClrMapping/>
+  </p:clrMapOvr>
+</p:sld>
+</file>
+
+<file path=ppt/slides/slide3.xml><?xml version="1.0" encoding="utf-8"?>
+<p:sld xmlns:a="http://schemas.openxmlformats.org/drawingml/2006/main" xmlns:r="http://schemas.openxmlformats.org/officeDocument/2006/relationships" xmlns:p="http://schemas.openxmlformats.org/presentationml/2006/main">
+  <p:cSld>
+    <p:bg>
+      <p:bgPr>
+        <a:blipFill rotWithShape="1">
+          <a:blip r:embed="rId2">
+            <a:duotone>
+              <a:schemeClr val="bg2">
+                <a:shade val="28000"/>
+                <a:satMod val="94000"/>
+                <a:lumMod val="20000"/>
+              </a:schemeClr>
+              <a:schemeClr val="bg2">
+                <a:tint val="94000"/>
+                <a:shade val="84000"/>
+                <a:satMod val="148000"/>
+                <a:lumMod val="114000"/>
+              </a:schemeClr>
+            </a:duotone>
+            <a:extLst/>
+          </a:blip>
+          <a:stretch/>
+        </a:blipFill>
+        <a:effectLst/>
+      </p:bgPr>
+    </p:bg>
+    <p:spTree>
+      <p:nvGrpSpPr>
+        <p:cNvPr id="1" name=""/>
+        <p:cNvGrpSpPr/>
+        <p:nvPr/>
+      </p:nvGrpSpPr>
+      <p:grpSpPr>
+        <a:xfrm>
+          <a:off x="0" y="0"/>
+          <a:ext cx="0" cy="0"/>
+          <a:chOff x="0" y="0"/>
+          <a:chExt cx="0" cy="0"/>
+        </a:xfrm>
+      </p:grpSpPr>
+      <p:pic>
+        <p:nvPicPr>
+          <p:cNvPr id="3" name="Marcador de contenido 2" descr="Imagen que contiene captura de pantalla, texto&#10;&#10;Descripción generada con confianza muy alta">
+            <a:extLst>
+              <a:ext uri="{FF2B5EF4-FFF2-40B4-BE49-F238E27FC236}">
+                <a16:creationId xmlns:a16="http://schemas.microsoft.com/office/drawing/2014/main" id="{EF16D344-E51D-4685-8C52-5AADD44E70CC}"/>
+              </a:ext>
+            </a:extLst>
+          </p:cNvPr>
+          <p:cNvPicPr>
+            <a:picLocks noGrp="1" noChangeAspect="1"/>
+          </p:cNvPicPr>
+          <p:nvPr>
+            <p:ph sz="half" idx="2"/>
+          </p:nvPr>
+        </p:nvPicPr>
+        <p:blipFill>
+          <a:blip r:embed="rId3"/>
+          <a:stretch>
+            <a:fillRect/>
+          </a:stretch>
+        </p:blipFill>
+        <p:spPr>
+          <a:xfrm>
+            <a:off x="5432223" y="645106"/>
+            <a:ext cx="5314175" cy="5247747"/>
+          </a:xfrm>
+          <a:prstGeom prst="roundRect">
+            <a:avLst>
+              <a:gd name="adj" fmla="val 3517"/>
+            </a:avLst>
+          </a:prstGeom>
+          <a:ln w="38100">
+            <a:gradFill flip="none" rotWithShape="1">
+              <a:gsLst>
+                <a:gs pos="0">
+                  <a:srgbClr val="363D46"/>
+                </a:gs>
+                <a:gs pos="100000">
+                  <a:srgbClr val="363D46">
+                    <a:lumMod val="75000"/>
+                  </a:srgbClr>
+                </a:gs>
+              </a:gsLst>
+              <a:lin ang="5400000" scaled="0"/>
+              <a:tileRect/>
+            </a:gradFill>
+          </a:ln>
+          <a:effectLst>
+            <a:innerShdw blurRad="57150" dist="38100" dir="14460000">
+              <a:srgbClr val="000000">
+                <a:alpha val="70000"/>
+              </a:srgbClr>
+            </a:innerShdw>
+          </a:effectLst>
+        </p:spPr>
+      </p:pic>
+      <p:sp>
+        <p:nvSpPr>
+          <p:cNvPr id="2" name="Título 1">
+            <a:extLst>
+              <a:ext uri="{FF2B5EF4-FFF2-40B4-BE49-F238E27FC236}">
+                <a16:creationId xmlns:a16="http://schemas.microsoft.com/office/drawing/2014/main" id="{0637D0E6-B3AB-40C0-8F05-8CFB5C59E36D}"/>
+              </a:ext>
+            </a:extLst>
+          </p:cNvPr>
+          <p:cNvSpPr>
+            <a:spLocks noGrp="1"/>
+          </p:cNvSpPr>
+          <p:nvPr>
+            <p:ph type="title"/>
+          </p:nvPr>
+        </p:nvSpPr>
+        <p:spPr>
+          <a:xfrm>
+            <a:off x="643192" y="609600"/>
+            <a:ext cx="3643674" cy="1905000"/>
+          </a:xfrm>
+        </p:spPr>
+        <p:txBody>
+          <a:bodyPr vert="horz" lIns="91440" tIns="45720" rIns="91440" bIns="45720" rtlCol="0" anchor="ctr">
+            <a:normAutofit/>
+          </a:bodyPr>
+          <a:lstStyle/>
+          <a:p>
+            <a:r>
+              <a:rPr lang="en-US" sz="2800"/>
+              <a:t>Representando a los avatares</a:t>
+            </a:r>
+          </a:p>
+        </p:txBody>
+      </p:sp>
+      <p:sp>
+        <p:nvSpPr>
+          <p:cNvPr id="4" name="Marcador de contenido 3">
+            <a:extLst>
+              <a:ext uri="{FF2B5EF4-FFF2-40B4-BE49-F238E27FC236}">
+                <a16:creationId xmlns:a16="http://schemas.microsoft.com/office/drawing/2014/main" id="{B000A8BB-6C17-4446-BD24-6E7FAD37EFAB}"/>
+              </a:ext>
+            </a:extLst>
+          </p:cNvPr>
+          <p:cNvSpPr>
+            <a:spLocks noGrp="1"/>
+          </p:cNvSpPr>
+          <p:nvPr>
+            <p:ph sz="half" idx="1"/>
+          </p:nvPr>
+        </p:nvSpPr>
+        <p:spPr>
+          <a:xfrm>
+            <a:off x="643192" y="2441712"/>
+            <a:ext cx="4226982" cy="3634410"/>
+          </a:xfrm>
+        </p:spPr>
+        <p:txBody>
+          <a:bodyPr vert="horz" lIns="91440" tIns="45720" rIns="91440" bIns="45720" rtlCol="0" anchor="ctr">
+            <a:normAutofit/>
+          </a:bodyPr>
+          <a:lstStyle/>
+          <a:p>
+            <a:pPr>
+              <a:lnSpc>
+                <a:spcPct val="90000"/>
+              </a:lnSpc>
+            </a:pPr>
+            <a:r>
+              <a:rPr lang="en-US" sz="1600" dirty="0" err="1"/>
+              <a:t>Representaremos</a:t>
+            </a:r>
+            <a:r>
+              <a:rPr lang="en-US" sz="1600" dirty="0"/>
+              <a:t> a </a:t>
+            </a:r>
+            <a:r>
+              <a:rPr lang="en-US" sz="1600" dirty="0" err="1"/>
+              <a:t>nuestro</a:t>
+            </a:r>
+            <a:r>
+              <a:rPr lang="en-US" sz="1600" dirty="0"/>
+              <a:t> avatar  con un </a:t>
+            </a:r>
+            <a:r>
+              <a:rPr lang="en-US" sz="1600" dirty="0" err="1"/>
+              <a:t>objeto</a:t>
+            </a:r>
+            <a:r>
+              <a:rPr lang="en-US" sz="1600" dirty="0"/>
+              <a:t> “Player”. El </a:t>
+            </a:r>
+            <a:r>
+              <a:rPr lang="en-US" sz="1600" dirty="0" err="1"/>
+              <a:t>objeto</a:t>
+            </a:r>
+            <a:r>
+              <a:rPr lang="en-US" sz="1600" dirty="0"/>
+              <a:t> </a:t>
+            </a:r>
+            <a:r>
+              <a:rPr lang="en-US" sz="1600" dirty="0" err="1"/>
+              <a:t>contendrá</a:t>
+            </a:r>
+            <a:r>
+              <a:rPr lang="en-US" sz="1600" dirty="0"/>
+              <a:t> el </a:t>
+            </a:r>
+            <a:r>
+              <a:rPr lang="en-US" sz="1600" dirty="0" err="1"/>
+              <a:t>estado</a:t>
+            </a:r>
+            <a:r>
+              <a:rPr lang="en-US" sz="1600" dirty="0"/>
+              <a:t> de </a:t>
+            </a:r>
+            <a:r>
+              <a:rPr lang="en-US" sz="1600" dirty="0" err="1"/>
+              <a:t>diferentes</a:t>
+            </a:r>
+            <a:r>
+              <a:rPr lang="en-US" sz="1600" dirty="0"/>
+              <a:t> </a:t>
+            </a:r>
+            <a:r>
+              <a:rPr lang="en-US" sz="1600" dirty="0" err="1"/>
+              <a:t>propiedades</a:t>
+            </a:r>
+            <a:r>
+              <a:rPr lang="en-US" sz="1600" dirty="0"/>
+              <a:t> </a:t>
+            </a:r>
+            <a:r>
+              <a:rPr lang="en-US" sz="1600" dirty="0" err="1"/>
+              <a:t>como</a:t>
+            </a:r>
+            <a:r>
+              <a:rPr lang="en-US" sz="1600" dirty="0"/>
+              <a:t> </a:t>
+            </a:r>
+            <a:r>
+              <a:rPr lang="en-US" sz="1600" dirty="0" err="1"/>
+              <a:t>serán</a:t>
+            </a:r>
+            <a:r>
+              <a:rPr lang="en-US" sz="1600" dirty="0"/>
+              <a:t>, la </a:t>
+            </a:r>
+            <a:r>
+              <a:rPr lang="en-US" sz="1600" dirty="0" err="1"/>
+              <a:t>posición</a:t>
+            </a:r>
+            <a:r>
+              <a:rPr lang="en-US" sz="1600" dirty="0"/>
+              <a:t> </a:t>
+            </a:r>
+            <a:r>
+              <a:rPr lang="en-US" sz="1600" dirty="0" err="1"/>
+              <a:t>en</a:t>
+            </a:r>
+            <a:r>
+              <a:rPr lang="en-US" sz="1600" dirty="0"/>
+              <a:t> la </a:t>
+            </a:r>
+            <a:r>
+              <a:rPr lang="en-US" sz="1600" dirty="0" err="1"/>
+              <a:t>pantalla</a:t>
+            </a:r>
+            <a:r>
+              <a:rPr lang="en-US" sz="1600" dirty="0"/>
+              <a:t> (canvas), el </a:t>
+            </a:r>
+            <a:r>
+              <a:rPr lang="en-US" sz="1600" dirty="0" err="1"/>
+              <a:t>número</a:t>
+            </a:r>
+            <a:r>
+              <a:rPr lang="en-US" sz="1600" dirty="0"/>
+              <a:t> de </a:t>
+            </a:r>
+            <a:r>
+              <a:rPr lang="en-US" sz="1600" dirty="0" err="1"/>
+              <a:t>vidas</a:t>
+            </a:r>
+            <a:r>
+              <a:rPr lang="en-US" sz="1600" dirty="0"/>
+              <a:t> que le </a:t>
+            </a:r>
+            <a:r>
+              <a:rPr lang="en-US" sz="1600" dirty="0" err="1"/>
+              <a:t>quedan</a:t>
+            </a:r>
+            <a:r>
+              <a:rPr lang="en-US" sz="1600" dirty="0"/>
+              <a:t>, </a:t>
+            </a:r>
+            <a:r>
+              <a:rPr lang="en-US" sz="1600" dirty="0" err="1"/>
+              <a:t>los</a:t>
+            </a:r>
+            <a:r>
+              <a:rPr lang="en-US" sz="1600" dirty="0"/>
+              <a:t> </a:t>
+            </a:r>
+            <a:r>
+              <a:rPr lang="en-US" sz="1600" dirty="0" err="1"/>
+              <a:t>puntos</a:t>
+            </a:r>
+            <a:r>
+              <a:rPr lang="en-US" sz="1600" dirty="0"/>
+              <a:t> que </a:t>
+            </a:r>
+            <a:r>
+              <a:rPr lang="en-US" sz="1600" dirty="0" err="1"/>
+              <a:t>lleva</a:t>
+            </a:r>
+            <a:r>
+              <a:rPr lang="en-US" sz="1600" dirty="0"/>
+              <a:t>, </a:t>
+            </a:r>
+            <a:r>
+              <a:rPr lang="en-US" sz="1600" dirty="0" err="1"/>
+              <a:t>si</a:t>
+            </a:r>
+            <a:r>
+              <a:rPr lang="en-US" sz="1600" dirty="0"/>
+              <a:t> le </a:t>
+            </a:r>
+            <a:r>
+              <a:rPr lang="en-US" sz="1600" dirty="0" err="1"/>
+              <a:t>han</a:t>
+            </a:r>
+            <a:r>
+              <a:rPr lang="en-US" sz="1600" dirty="0"/>
+              <a:t> </a:t>
+            </a:r>
+            <a:r>
+              <a:rPr lang="en-US" sz="1600" dirty="0" err="1"/>
+              <a:t>matado</a:t>
+            </a:r>
+            <a:r>
+              <a:rPr lang="en-US" sz="1600" dirty="0"/>
+              <a:t>… </a:t>
+            </a:r>
+            <a:r>
+              <a:rPr lang="en-US" sz="1600" dirty="0" err="1"/>
+              <a:t>Además</a:t>
+            </a:r>
+            <a:r>
+              <a:rPr lang="en-US" sz="1600" dirty="0"/>
+              <a:t> se </a:t>
+            </a:r>
+            <a:r>
+              <a:rPr lang="en-US" sz="1600" dirty="0" err="1"/>
+              <a:t>añaden</a:t>
+            </a:r>
+            <a:r>
+              <a:rPr lang="en-US" sz="1600" dirty="0"/>
+              <a:t> </a:t>
+            </a:r>
+            <a:r>
+              <a:rPr lang="en-US" sz="1600" dirty="0" err="1"/>
+              <a:t>en</a:t>
+            </a:r>
+            <a:r>
+              <a:rPr lang="en-US" sz="1600" dirty="0"/>
+              <a:t> forma de </a:t>
+            </a:r>
+            <a:r>
+              <a:rPr lang="en-US" sz="1600" dirty="0" err="1"/>
+              <a:t>métodos</a:t>
+            </a:r>
+            <a:r>
+              <a:rPr lang="en-US" sz="1600" dirty="0"/>
+              <a:t> </a:t>
+            </a:r>
+            <a:r>
+              <a:rPr lang="en-US" sz="1600" dirty="0" err="1"/>
+              <a:t>los</a:t>
+            </a:r>
+            <a:r>
+              <a:rPr lang="en-US" sz="1600" dirty="0"/>
+              <a:t> </a:t>
+            </a:r>
+            <a:r>
+              <a:rPr lang="en-US" sz="1600" dirty="0" err="1"/>
+              <a:t>comportamientos</a:t>
+            </a:r>
+            <a:r>
+              <a:rPr lang="en-US" sz="1600" dirty="0"/>
+              <a:t> de </a:t>
+            </a:r>
+            <a:r>
+              <a:rPr lang="en-US" sz="1600" dirty="0" err="1"/>
+              <a:t>disparar</a:t>
+            </a:r>
+            <a:r>
+              <a:rPr lang="en-US" sz="1600" dirty="0"/>
+              <a:t> (</a:t>
+            </a:r>
+            <a:r>
+              <a:rPr lang="en-US" sz="1600" dirty="0" err="1"/>
+              <a:t>método</a:t>
+            </a:r>
+            <a:r>
+              <a:rPr lang="en-US" sz="1600" dirty="0"/>
+              <a:t> </a:t>
+            </a:r>
+            <a:r>
+              <a:rPr lang="en-US" sz="1600" dirty="0" err="1"/>
+              <a:t>privado</a:t>
+            </a:r>
+            <a:r>
+              <a:rPr lang="en-US" sz="1600" dirty="0"/>
+              <a:t> “shoot”), de </a:t>
+            </a:r>
+            <a:r>
+              <a:rPr lang="en-US" sz="1600" dirty="0" err="1"/>
+              <a:t>hacer</a:t>
+            </a:r>
+            <a:r>
+              <a:rPr lang="en-US" sz="1600" dirty="0"/>
+              <a:t> </a:t>
+            </a:r>
+            <a:r>
+              <a:rPr lang="en-US" sz="1600" dirty="0" err="1"/>
+              <a:t>algo</a:t>
+            </a:r>
+            <a:r>
+              <a:rPr lang="en-US" sz="1600" dirty="0"/>
+              <a:t> </a:t>
+            </a:r>
+            <a:r>
+              <a:rPr lang="en-US" sz="1600" dirty="0" err="1"/>
+              <a:t>cuando</a:t>
+            </a:r>
+            <a:r>
+              <a:rPr lang="en-US" sz="1600" dirty="0"/>
+              <a:t> el </a:t>
+            </a:r>
+            <a:r>
+              <a:rPr lang="en-US" sz="1600" dirty="0" err="1"/>
+              <a:t>jugador</a:t>
+            </a:r>
+            <a:r>
+              <a:rPr lang="en-US" sz="1600" dirty="0"/>
+              <a:t> pulse </a:t>
+            </a:r>
+            <a:r>
+              <a:rPr lang="en-US" sz="1600" dirty="0" err="1"/>
+              <a:t>una</a:t>
+            </a:r>
+            <a:r>
+              <a:rPr lang="en-US" sz="1600" dirty="0"/>
+              <a:t> </a:t>
+            </a:r>
+            <a:r>
+              <a:rPr lang="en-US" sz="1600" dirty="0" err="1"/>
+              <a:t>tecla</a:t>
+            </a:r>
+            <a:r>
+              <a:rPr lang="en-US" sz="1600" dirty="0"/>
+              <a:t> (</a:t>
+            </a:r>
+            <a:r>
+              <a:rPr lang="en-US" sz="1600" dirty="0" err="1"/>
+              <a:t>método</a:t>
+            </a:r>
+            <a:r>
+              <a:rPr lang="en-US" sz="1600" dirty="0"/>
+              <a:t> </a:t>
+            </a:r>
+            <a:r>
+              <a:rPr lang="en-US" sz="1600" dirty="0" err="1"/>
+              <a:t>público</a:t>
+            </a:r>
+            <a:r>
+              <a:rPr lang="en-US" sz="1600" dirty="0"/>
+              <a:t> “</a:t>
+            </a:r>
+            <a:r>
+              <a:rPr lang="en-US" sz="1600" dirty="0" err="1"/>
+              <a:t>doAnything</a:t>
+            </a:r>
+            <a:r>
+              <a:rPr lang="en-US" sz="1600" dirty="0"/>
+              <a:t>”) y de </a:t>
+            </a:r>
+            <a:r>
+              <a:rPr lang="en-US" sz="1600" dirty="0" err="1"/>
+              <a:t>matar</a:t>
+            </a:r>
+            <a:r>
+              <a:rPr lang="en-US" sz="1600" dirty="0"/>
+              <a:t> al </a:t>
+            </a:r>
+            <a:r>
+              <a:rPr lang="en-US" sz="1600" dirty="0" err="1"/>
+              <a:t>jugador</a:t>
+            </a:r>
+            <a:r>
+              <a:rPr lang="en-US" sz="1600" dirty="0"/>
+              <a:t> (</a:t>
+            </a:r>
+            <a:r>
+              <a:rPr lang="en-US" sz="1600" dirty="0" err="1"/>
+              <a:t>método</a:t>
+            </a:r>
+            <a:r>
+              <a:rPr lang="en-US" sz="1600" dirty="0"/>
+              <a:t> </a:t>
+            </a:r>
+            <a:r>
+              <a:rPr lang="en-US" sz="1600" dirty="0" err="1"/>
+              <a:t>público</a:t>
+            </a:r>
+            <a:r>
+              <a:rPr lang="en-US" sz="1600" dirty="0"/>
+              <a:t> “</a:t>
+            </a:r>
+            <a:r>
+              <a:rPr lang="en-US" sz="1600" dirty="0" err="1"/>
+              <a:t>killPlayer</a:t>
+            </a:r>
+            <a:r>
+              <a:rPr lang="en-US" sz="1600" dirty="0"/>
+              <a:t>”).</a:t>
+            </a:r>
+          </a:p>
+        </p:txBody>
+      </p:sp>
+    </p:spTree>
+    <p:extLst>
+      <p:ext uri="{BB962C8B-B14F-4D97-AF65-F5344CB8AC3E}">
+        <p14:creationId xmlns:p14="http://schemas.microsoft.com/office/powerpoint/2010/main" val="1972886553"/>
+      </p:ext>
+    </p:extLst>
+  </p:cSld>
+  <p:clrMapOvr>
+    <a:masterClrMapping/>
+  </p:clrMapOvr>
+</p:sld>
+</file>
+
+<file path=ppt/slides/slide4.xml><?xml version="1.0" encoding="utf-8"?>
+<p:sld xmlns:a="http://schemas.openxmlformats.org/drawingml/2006/main" xmlns:r="http://schemas.openxmlformats.org/officeDocument/2006/relationships" xmlns:p="http://schemas.openxmlformats.org/presentationml/2006/main">
+  <p:cSld>
+    <p:bg>
+      <p:bgPr>
+        <a:blipFill rotWithShape="1">
+          <a:blip r:embed="rId2">
+            <a:duotone>
+              <a:schemeClr val="bg2">
+                <a:shade val="28000"/>
+                <a:satMod val="94000"/>
+                <a:lumMod val="20000"/>
+              </a:schemeClr>
+              <a:schemeClr val="bg2">
+                <a:tint val="94000"/>
+                <a:shade val="84000"/>
+                <a:satMod val="148000"/>
+                <a:lumMod val="114000"/>
+              </a:schemeClr>
+            </a:duotone>
+            <a:extLst/>
+          </a:blip>
+          <a:stretch/>
+        </a:blipFill>
+        <a:effectLst/>
+      </p:bgPr>
+    </p:bg>
+    <p:spTree>
+      <p:nvGrpSpPr>
+        <p:cNvPr id="1" name=""/>
+        <p:cNvGrpSpPr/>
+        <p:nvPr/>
+      </p:nvGrpSpPr>
+      <p:grpSpPr>
+        <a:xfrm>
+          <a:off x="0" y="0"/>
+          <a:ext cx="0" cy="0"/>
+          <a:chOff x="0" y="0"/>
+          <a:chExt cx="0" cy="0"/>
+        </a:xfrm>
+      </p:grpSpPr>
+      <p:pic>
+        <p:nvPicPr>
+          <p:cNvPr id="3" name="Marcador de contenido 2" descr="Imagen que contiene captura de pantalla&#10;&#10;Descripción generada con confianza muy alta">
+            <a:extLst>
+              <a:ext uri="{FF2B5EF4-FFF2-40B4-BE49-F238E27FC236}">
+                <a16:creationId xmlns:a16="http://schemas.microsoft.com/office/drawing/2014/main" id="{05A86539-2815-497E-B2D6-ED123DDB001F}"/>
+              </a:ext>
+            </a:extLst>
+          </p:cNvPr>
+          <p:cNvPicPr>
+            <a:picLocks noGrp="1" noChangeAspect="1"/>
+          </p:cNvPicPr>
+          <p:nvPr>
+            <p:ph sz="half" idx="2"/>
+          </p:nvPr>
+        </p:nvPicPr>
+        <p:blipFill>
+          <a:blip r:embed="rId3"/>
+          <a:stretch>
+            <a:fillRect/>
+          </a:stretch>
+        </p:blipFill>
+        <p:spPr>
+          <a:xfrm>
+            <a:off x="5123586" y="1695446"/>
+            <a:ext cx="6424041" cy="3698189"/>
+          </a:xfrm>
+          <a:prstGeom prst="roundRect">
+            <a:avLst>
+              <a:gd name="adj" fmla="val 3517"/>
+            </a:avLst>
+          </a:prstGeom>
+          <a:ln w="38100">
+            <a:gradFill flip="none" rotWithShape="1">
+              <a:gsLst>
+                <a:gs pos="0">
+                  <a:srgbClr val="363D46"/>
+                </a:gs>
+                <a:gs pos="100000">
+                  <a:srgbClr val="363D46">
+                    <a:lumMod val="75000"/>
+                  </a:srgbClr>
+                </a:gs>
+              </a:gsLst>
+              <a:lin ang="5400000" scaled="0"/>
+              <a:tileRect/>
+            </a:gradFill>
+          </a:ln>
+          <a:effectLst>
+            <a:innerShdw blurRad="57150" dist="38100" dir="14460000">
+              <a:srgbClr val="000000">
+                <a:alpha val="70000"/>
+              </a:srgbClr>
+            </a:innerShdw>
+          </a:effectLst>
+        </p:spPr>
+      </p:pic>
+      <p:sp>
+        <p:nvSpPr>
+          <p:cNvPr id="2" name="Título 1">
+            <a:extLst>
+              <a:ext uri="{FF2B5EF4-FFF2-40B4-BE49-F238E27FC236}">
+                <a16:creationId xmlns:a16="http://schemas.microsoft.com/office/drawing/2014/main" id="{0637D0E6-B3AB-40C0-8F05-8CFB5C59E36D}"/>
+              </a:ext>
+            </a:extLst>
+          </p:cNvPr>
+          <p:cNvSpPr>
+            <a:spLocks noGrp="1"/>
+          </p:cNvSpPr>
+          <p:nvPr>
+            <p:ph type="title"/>
+          </p:nvPr>
+        </p:nvSpPr>
+        <p:spPr>
+          <a:xfrm>
+            <a:off x="855225" y="450573"/>
+            <a:ext cx="7221975" cy="1192697"/>
+          </a:xfrm>
+        </p:spPr>
+        <p:txBody>
+          <a:bodyPr vert="horz" lIns="91440" tIns="45720" rIns="91440" bIns="45720" rtlCol="0" anchor="ctr">
+            <a:normAutofit/>
+          </a:bodyPr>
+          <a:lstStyle/>
+          <a:p>
+            <a:r>
+              <a:rPr lang="en-US" sz="2800" dirty="0" err="1"/>
+              <a:t>Representando</a:t>
+            </a:r>
+            <a:r>
+              <a:rPr lang="en-US" sz="2800" dirty="0"/>
+              <a:t> a </a:t>
+            </a:r>
+            <a:r>
+              <a:rPr lang="en-US" sz="2800" dirty="0" err="1"/>
+              <a:t>los</a:t>
+            </a:r>
+            <a:r>
+              <a:rPr lang="en-US" sz="2800" dirty="0"/>
+              <a:t> </a:t>
+            </a:r>
+            <a:r>
+              <a:rPr lang="en-US" sz="2800" dirty="0" err="1"/>
+              <a:t>avatares</a:t>
+            </a:r>
+            <a:endParaRPr lang="en-US" sz="2800" dirty="0"/>
+          </a:p>
+        </p:txBody>
+      </p:sp>
+      <p:sp>
+        <p:nvSpPr>
+          <p:cNvPr id="4" name="Marcador de contenido 3">
+            <a:extLst>
+              <a:ext uri="{FF2B5EF4-FFF2-40B4-BE49-F238E27FC236}">
+                <a16:creationId xmlns:a16="http://schemas.microsoft.com/office/drawing/2014/main" id="{B000A8BB-6C17-4446-BD24-6E7FAD37EFAB}"/>
+              </a:ext>
+            </a:extLst>
+          </p:cNvPr>
+          <p:cNvSpPr>
+            <a:spLocks noGrp="1"/>
+          </p:cNvSpPr>
+          <p:nvPr>
+            <p:ph sz="half" idx="1"/>
+          </p:nvPr>
+        </p:nvSpPr>
+        <p:spPr>
+          <a:xfrm>
+            <a:off x="490329" y="2435086"/>
+            <a:ext cx="4472610" cy="3216276"/>
+          </a:xfrm>
+        </p:spPr>
+        <p:txBody>
+          <a:bodyPr vert="horz" lIns="91440" tIns="45720" rIns="91440" bIns="45720" rtlCol="0" anchor="ctr">
+            <a:noAutofit/>
+          </a:bodyPr>
+          <a:lstStyle/>
+          <a:p>
+            <a:pPr lvl="0"/>
+            <a:r>
+              <a:rPr lang="es-EC" dirty="0">
+                <a:effectLst/>
+              </a:rPr>
+              <a:t>Para representar los disparos de ambos se uso herencia y reciclo las propiedades y comportamientos del disparo en un objeto (</a:t>
+            </a:r>
+            <a:r>
+              <a:rPr lang="es-EC" dirty="0" err="1">
+                <a:effectLst/>
+              </a:rPr>
+              <a:t>Shot</a:t>
+            </a:r>
+            <a:r>
+              <a:rPr lang="es-EC" dirty="0">
+                <a:effectLst/>
+              </a:rPr>
+              <a:t>), y extender las propiedades y comportamientos concretos en un objeto para el disparo del avatar (</a:t>
+            </a:r>
+            <a:r>
+              <a:rPr lang="es-EC" dirty="0" err="1">
+                <a:effectLst/>
+              </a:rPr>
+              <a:t>PlayerShot</a:t>
+            </a:r>
+            <a:r>
+              <a:rPr lang="es-EC" dirty="0">
+                <a:effectLst/>
+              </a:rPr>
+              <a:t>) y otro para el disparo de los malos (</a:t>
+            </a:r>
+            <a:r>
+              <a:rPr lang="es-EC" dirty="0" err="1">
+                <a:effectLst/>
+              </a:rPr>
+              <a:t>EvilShot</a:t>
+            </a:r>
+            <a:r>
+              <a:rPr lang="es-EC" dirty="0">
+                <a:effectLst/>
+              </a:rPr>
+              <a:t>). </a:t>
+            </a:r>
+          </a:p>
+          <a:p>
+            <a:pPr lvl="0"/>
+            <a:r>
+              <a:rPr lang="es-EC" dirty="0">
+                <a:effectLst/>
+              </a:rPr>
+              <a:t>Los disparos, tienen determinadas características comunes como son: la posición en el </a:t>
+            </a:r>
+            <a:r>
+              <a:rPr lang="es-EC" dirty="0" err="1">
+                <a:effectLst/>
+              </a:rPr>
+              <a:t>canvas</a:t>
+            </a:r>
+            <a:r>
+              <a:rPr lang="es-EC" dirty="0">
+                <a:effectLst/>
+              </a:rPr>
+              <a:t>, un identificador, una imagen y el comportamiento de añadirse o eliminarse a un buffer que será gestionado para pintar la pantalla. </a:t>
+            </a:r>
+          </a:p>
+        </p:txBody>
+      </p:sp>
+    </p:spTree>
+    <p:extLst>
+      <p:ext uri="{BB962C8B-B14F-4D97-AF65-F5344CB8AC3E}">
+        <p14:creationId xmlns:p14="http://schemas.microsoft.com/office/powerpoint/2010/main" val="2340428223"/>
+      </p:ext>
+    </p:extLst>
+  </p:cSld>
+  <p:clrMapOvr>
+    <a:masterClrMapping/>
+  </p:clrMapOvr>
+</p:sld>
+</file>
+
+<file path=ppt/slides/slide5.xml><?xml version="1.0" encoding="utf-8"?>
+<p:sld xmlns:a="http://schemas.openxmlformats.org/drawingml/2006/main" xmlns:r="http://schemas.openxmlformats.org/officeDocument/2006/relationships" xmlns:p="http://schemas.openxmlformats.org/presentationml/2006/main">
+  <p:cSld>
+    <p:bg>
+      <p:bgPr>
+        <a:blipFill rotWithShape="1">
+          <a:blip r:embed="rId2">
+            <a:duotone>
+              <a:schemeClr val="bg2">
+                <a:shade val="28000"/>
+                <a:satMod val="94000"/>
+                <a:lumMod val="20000"/>
+              </a:schemeClr>
+              <a:schemeClr val="bg2">
+                <a:tint val="94000"/>
+                <a:shade val="84000"/>
+                <a:satMod val="148000"/>
+                <a:lumMod val="114000"/>
+              </a:schemeClr>
+            </a:duotone>
+            <a:extLst/>
+          </a:blip>
+          <a:stretch/>
+        </a:blipFill>
+        <a:effectLst/>
+      </p:bgPr>
+    </p:bg>
+    <p:spTree>
+      <p:nvGrpSpPr>
+        <p:cNvPr id="1" name=""/>
+        <p:cNvGrpSpPr/>
+        <p:nvPr/>
+      </p:nvGrpSpPr>
+      <p:grpSpPr>
+        <a:xfrm>
+          <a:off x="0" y="0"/>
+          <a:ext cx="0" cy="0"/>
+          <a:chOff x="0" y="0"/>
+          <a:chExt cx="0" cy="0"/>
+        </a:xfrm>
+      </p:grpSpPr>
+      <p:pic>
+        <p:nvPicPr>
+          <p:cNvPr id="5" name="Marcador de contenido 4">
+            <a:extLst>
+              <a:ext uri="{FF2B5EF4-FFF2-40B4-BE49-F238E27FC236}">
+                <a16:creationId xmlns:a16="http://schemas.microsoft.com/office/drawing/2014/main" id="{FB0BF9DC-0965-4EB2-891F-D5BA40F4A673}"/>
+              </a:ext>
+            </a:extLst>
+          </p:cNvPr>
+          <p:cNvPicPr>
+            <a:picLocks noGrp="1" noChangeAspect="1"/>
+          </p:cNvPicPr>
+          <p:nvPr>
+            <p:ph sz="half" idx="2"/>
+          </p:nvPr>
+        </p:nvPicPr>
+        <p:blipFill>
+          <a:blip r:embed="rId3"/>
+          <a:stretch>
+            <a:fillRect/>
+          </a:stretch>
+        </p:blipFill>
+        <p:spPr>
+          <a:xfrm>
+            <a:off x="4630994" y="2006693"/>
+            <a:ext cx="6916633" cy="3559219"/>
+          </a:xfrm>
+          <a:prstGeom prst="roundRect">
+            <a:avLst>
+              <a:gd name="adj" fmla="val 3517"/>
+            </a:avLst>
+          </a:prstGeom>
+          <a:ln w="38100">
+            <a:gradFill flip="none" rotWithShape="1">
+              <a:gsLst>
+                <a:gs pos="0">
+                  <a:srgbClr val="363D46"/>
+                </a:gs>
+                <a:gs pos="100000">
+                  <a:srgbClr val="363D46">
+                    <a:lumMod val="75000"/>
+                  </a:srgbClr>
+                </a:gs>
+              </a:gsLst>
+              <a:lin ang="5400000" scaled="0"/>
+              <a:tileRect/>
+            </a:gradFill>
+          </a:ln>
+          <a:effectLst>
+            <a:innerShdw blurRad="57150" dist="38100" dir="14460000">
+              <a:srgbClr val="000000">
+                <a:alpha val="70000"/>
+              </a:srgbClr>
+            </a:innerShdw>
+          </a:effectLst>
+        </p:spPr>
+      </p:pic>
+      <p:sp>
+        <p:nvSpPr>
+          <p:cNvPr id="2" name="Título 1">
+            <a:extLst>
+              <a:ext uri="{FF2B5EF4-FFF2-40B4-BE49-F238E27FC236}">
+                <a16:creationId xmlns:a16="http://schemas.microsoft.com/office/drawing/2014/main" id="{7AA2035F-2500-4DE4-AC3C-77FF2C835D0D}"/>
+              </a:ext>
+            </a:extLst>
+          </p:cNvPr>
+          <p:cNvSpPr>
+            <a:spLocks noGrp="1"/>
+          </p:cNvSpPr>
+          <p:nvPr>
+            <p:ph type="title"/>
+          </p:nvPr>
+        </p:nvSpPr>
+        <p:spPr>
+          <a:xfrm>
+            <a:off x="643192" y="609600"/>
+            <a:ext cx="10203712" cy="1199322"/>
+          </a:xfrm>
+        </p:spPr>
+        <p:txBody>
+          <a:bodyPr vert="horz" lIns="91440" tIns="45720" rIns="91440" bIns="45720" rtlCol="0" anchor="ctr">
+            <a:normAutofit/>
+          </a:bodyPr>
+          <a:lstStyle/>
+          <a:p>
+            <a:r>
+              <a:rPr lang="en-US" sz="2800" dirty="0"/>
+              <a:t>El </a:t>
+            </a:r>
+            <a:r>
+              <a:rPr lang="en-US" sz="2800" dirty="0" err="1"/>
+              <a:t>movimiento</a:t>
+            </a:r>
+            <a:r>
+              <a:rPr lang="en-US" sz="2800" dirty="0"/>
+              <a:t> y las </a:t>
+            </a:r>
+            <a:r>
+              <a:rPr lang="en-US" sz="2800" dirty="0" err="1"/>
+              <a:t>interacciones</a:t>
+            </a:r>
+            <a:r>
+              <a:rPr lang="en-US" sz="2800" dirty="0"/>
+              <a:t>.</a:t>
+            </a:r>
+          </a:p>
+        </p:txBody>
+      </p:sp>
+      <p:sp>
+        <p:nvSpPr>
+          <p:cNvPr id="3" name="Marcador de contenido 2">
+            <a:extLst>
+              <a:ext uri="{FF2B5EF4-FFF2-40B4-BE49-F238E27FC236}">
+                <a16:creationId xmlns:a16="http://schemas.microsoft.com/office/drawing/2014/main" id="{B89627AA-54B2-4C03-A0CD-56339382E066}"/>
+              </a:ext>
+            </a:extLst>
+          </p:cNvPr>
+          <p:cNvSpPr>
+            <a:spLocks noGrp="1"/>
+          </p:cNvSpPr>
+          <p:nvPr>
+            <p:ph sz="half" idx="1"/>
+          </p:nvPr>
+        </p:nvSpPr>
+        <p:spPr>
+          <a:xfrm>
+            <a:off x="643192" y="2006693"/>
+            <a:ext cx="3643674" cy="3876582"/>
+          </a:xfrm>
+        </p:spPr>
+        <p:txBody>
+          <a:bodyPr vert="horz" lIns="91440" tIns="45720" rIns="91440" bIns="45720" rtlCol="0" anchor="ctr">
+            <a:normAutofit/>
+          </a:bodyPr>
+          <a:lstStyle/>
+          <a:p>
+            <a:pPr lvl="0"/>
+            <a:r>
+              <a:rPr lang="es-EC" sz="1600" dirty="0">
+                <a:effectLst/>
+              </a:rPr>
+              <a:t>Para responder la pregunta del movimiento del </a:t>
+            </a:r>
+            <a:r>
+              <a:rPr lang="es-EC" sz="1600" dirty="0" err="1">
+                <a:effectLst/>
+              </a:rPr>
+              <a:t>canvas</a:t>
+            </a:r>
+            <a:r>
+              <a:rPr lang="es-EC" sz="1600" dirty="0">
+                <a:effectLst/>
+              </a:rPr>
+              <a:t> hacemos uso de un </a:t>
+            </a:r>
+            <a:r>
+              <a:rPr lang="es-EC" sz="1600" dirty="0" err="1">
+                <a:effectLst/>
+              </a:rPr>
+              <a:t>code</a:t>
+            </a:r>
+            <a:r>
+              <a:rPr lang="es-EC" sz="1600" dirty="0">
+                <a:effectLst/>
+              </a:rPr>
+              <a:t>. Supongamos el caso de un computador. El computador trabaja en función a unos ciclos de reloj, según el cual, en cada ciclo se actualiza el estado de los bits que maneja. Pues en el juego es </a:t>
+            </a:r>
+            <a:r>
+              <a:rPr lang="es-EC" sz="1600" dirty="0" err="1">
+                <a:effectLst/>
+              </a:rPr>
+              <a:t>exáctamente</a:t>
+            </a:r>
+            <a:r>
+              <a:rPr lang="es-EC" sz="1600" dirty="0">
+                <a:effectLst/>
+              </a:rPr>
+              <a:t> lo mismo. Tenemos una función </a:t>
+            </a:r>
+            <a:r>
+              <a:rPr lang="es-EC" sz="1600" u="sng" dirty="0" err="1">
+                <a:effectLst/>
+                <a:hlinkClick r:id="rId4"/>
+              </a:rPr>
+              <a:t>requestAnimFrame</a:t>
+            </a:r>
+            <a:r>
+              <a:rPr lang="es-EC" sz="1600" dirty="0">
+                <a:effectLst/>
+              </a:rPr>
+              <a:t> que será quien nos marque los pulsos. </a:t>
+            </a:r>
+            <a:r>
+              <a:rPr lang="en-US" sz="1600" dirty="0" err="1">
+                <a:effectLst/>
+              </a:rPr>
+              <a:t>Después</a:t>
+            </a:r>
+            <a:r>
+              <a:rPr lang="en-US" sz="1600" dirty="0">
+                <a:effectLst/>
+              </a:rPr>
+              <a:t> de </a:t>
+            </a:r>
+            <a:r>
+              <a:rPr lang="en-US" sz="1600" dirty="0" err="1">
+                <a:effectLst/>
+              </a:rPr>
+              <a:t>cada</a:t>
+            </a:r>
+            <a:r>
+              <a:rPr lang="en-US" sz="1600" dirty="0">
+                <a:effectLst/>
+              </a:rPr>
+              <a:t> </a:t>
+            </a:r>
+            <a:r>
+              <a:rPr lang="en-US" sz="1600" dirty="0" err="1">
+                <a:effectLst/>
+              </a:rPr>
+              <a:t>pulso</a:t>
+            </a:r>
+            <a:r>
+              <a:rPr lang="en-US" sz="1600" dirty="0">
+                <a:effectLst/>
+              </a:rPr>
+              <a:t> </a:t>
+            </a:r>
+            <a:r>
+              <a:rPr lang="en-US" sz="1600" dirty="0" err="1">
+                <a:effectLst/>
+              </a:rPr>
+              <a:t>nosotros</a:t>
+            </a:r>
+            <a:r>
+              <a:rPr lang="en-US" sz="1600" dirty="0">
+                <a:effectLst/>
+              </a:rPr>
+              <a:t> </a:t>
+            </a:r>
+            <a:r>
+              <a:rPr lang="en-US" sz="1600" dirty="0" err="1">
+                <a:effectLst/>
+              </a:rPr>
+              <a:t>actualizamos</a:t>
+            </a:r>
+            <a:r>
+              <a:rPr lang="en-US" sz="1600" dirty="0">
+                <a:effectLst/>
+              </a:rPr>
+              <a:t> el </a:t>
+            </a:r>
+            <a:r>
+              <a:rPr lang="en-US" sz="1600" dirty="0" err="1">
+                <a:effectLst/>
+              </a:rPr>
+              <a:t>estado</a:t>
+            </a:r>
+            <a:r>
+              <a:rPr lang="en-US" sz="1600" dirty="0">
+                <a:effectLst/>
+              </a:rPr>
+              <a:t> del canvas</a:t>
+            </a:r>
+            <a:endParaRPr lang="es-EC" sz="1600" dirty="0">
+              <a:effectLst/>
+            </a:endParaRPr>
+          </a:p>
+        </p:txBody>
+      </p:sp>
+    </p:spTree>
+    <p:extLst>
+      <p:ext uri="{BB962C8B-B14F-4D97-AF65-F5344CB8AC3E}">
+        <p14:creationId xmlns:p14="http://schemas.microsoft.com/office/powerpoint/2010/main" val="491696835"/>
+      </p:ext>
+    </p:extLst>
+  </p:cSld>
+  <p:clrMapOvr>
+    <a:masterClrMapping/>
+  </p:clrMapOvr>
+</p:sld>
+</file>
+
+<file path=ppt/slides/slide6.xml><?xml version="1.0" encoding="utf-8"?>
+<p:sld xmlns:a="http://schemas.openxmlformats.org/drawingml/2006/main" xmlns:r="http://schemas.openxmlformats.org/officeDocument/2006/relationships" xmlns:p="http://schemas.openxmlformats.org/presentationml/2006/main">
+  <p:cSld>
+    <p:bg>
+      <p:bgPr>
+        <a:blipFill rotWithShape="1">
+          <a:blip r:embed="rId2">
+            <a:duotone>
+              <a:schemeClr val="bg2">
+                <a:shade val="28000"/>
+                <a:satMod val="94000"/>
+                <a:lumMod val="20000"/>
+              </a:schemeClr>
+              <a:schemeClr val="bg2">
+                <a:tint val="94000"/>
+                <a:shade val="84000"/>
+                <a:satMod val="148000"/>
+                <a:lumMod val="114000"/>
+              </a:schemeClr>
+            </a:duotone>
+            <a:extLst/>
+          </a:blip>
+          <a:stretch/>
+        </a:blipFill>
+        <a:effectLst/>
+      </p:bgPr>
+    </p:bg>
+    <p:spTree>
+      <p:nvGrpSpPr>
+        <p:cNvPr id="1" name=""/>
+        <p:cNvGrpSpPr/>
+        <p:nvPr/>
+      </p:nvGrpSpPr>
+      <p:grpSpPr>
+        <a:xfrm>
+          <a:off x="0" y="0"/>
+          <a:ext cx="0" cy="0"/>
+          <a:chOff x="0" y="0"/>
+          <a:chExt cx="0" cy="0"/>
+        </a:xfrm>
+      </p:grpSpPr>
+      <p:pic>
+        <p:nvPicPr>
+          <p:cNvPr id="5" name="Marcador de contenido 4">
+            <a:extLst>
+              <a:ext uri="{FF2B5EF4-FFF2-40B4-BE49-F238E27FC236}">
+                <a16:creationId xmlns:a16="http://schemas.microsoft.com/office/drawing/2014/main" id="{A2F575ED-FBDB-42AB-AEB2-28E595D98087}"/>
+              </a:ext>
+            </a:extLst>
+          </p:cNvPr>
+          <p:cNvPicPr>
+            <a:picLocks noGrp="1" noChangeAspect="1"/>
+          </p:cNvPicPr>
+          <p:nvPr>
+            <p:ph sz="half" idx="2"/>
+          </p:nvPr>
+        </p:nvPicPr>
+        <p:blipFill>
+          <a:blip r:embed="rId3"/>
+          <a:stretch>
+            <a:fillRect/>
+          </a:stretch>
+        </p:blipFill>
+        <p:spPr>
+          <a:xfrm>
+            <a:off x="4630994" y="1868361"/>
+            <a:ext cx="6916633" cy="3280109"/>
+          </a:xfrm>
+          <a:prstGeom prst="roundRect">
+            <a:avLst>
+              <a:gd name="adj" fmla="val 3517"/>
+            </a:avLst>
+          </a:prstGeom>
+          <a:ln w="38100">
+            <a:gradFill flip="none" rotWithShape="1">
+              <a:gsLst>
+                <a:gs pos="0">
+                  <a:srgbClr val="363D46"/>
+                </a:gs>
+                <a:gs pos="100000">
+                  <a:srgbClr val="363D46">
+                    <a:lumMod val="75000"/>
+                  </a:srgbClr>
+                </a:gs>
+              </a:gsLst>
+              <a:lin ang="5400000" scaled="0"/>
+              <a:tileRect/>
+            </a:gradFill>
+          </a:ln>
+          <a:effectLst>
+            <a:innerShdw blurRad="57150" dist="38100" dir="14460000">
+              <a:srgbClr val="000000">
+                <a:alpha val="70000"/>
+              </a:srgbClr>
+            </a:innerShdw>
+          </a:effectLst>
+        </p:spPr>
+      </p:pic>
+      <p:sp>
+        <p:nvSpPr>
+          <p:cNvPr id="2" name="Título 1">
+            <a:extLst>
+              <a:ext uri="{FF2B5EF4-FFF2-40B4-BE49-F238E27FC236}">
+                <a16:creationId xmlns:a16="http://schemas.microsoft.com/office/drawing/2014/main" id="{7AA2035F-2500-4DE4-AC3C-77FF2C835D0D}"/>
+              </a:ext>
+            </a:extLst>
+          </p:cNvPr>
+          <p:cNvSpPr>
+            <a:spLocks noGrp="1"/>
+          </p:cNvSpPr>
+          <p:nvPr>
+            <p:ph type="title"/>
+          </p:nvPr>
+        </p:nvSpPr>
+        <p:spPr>
+          <a:xfrm>
+            <a:off x="643191" y="609600"/>
+            <a:ext cx="8003851" cy="1066800"/>
+          </a:xfrm>
+        </p:spPr>
+        <p:txBody>
+          <a:bodyPr vert="horz" lIns="91440" tIns="45720" rIns="91440" bIns="45720" rtlCol="0" anchor="ctr">
+            <a:normAutofit/>
+          </a:bodyPr>
+          <a:lstStyle/>
+          <a:p>
+            <a:r>
+              <a:rPr lang="en-US" sz="2800" dirty="0"/>
+              <a:t>El </a:t>
+            </a:r>
+            <a:r>
+              <a:rPr lang="en-US" sz="2800" dirty="0" err="1"/>
+              <a:t>movimiento</a:t>
+            </a:r>
+            <a:r>
+              <a:rPr lang="en-US" sz="2800" dirty="0"/>
+              <a:t> y las </a:t>
+            </a:r>
+            <a:r>
+              <a:rPr lang="en-US" sz="2800" dirty="0" err="1"/>
+              <a:t>interacciones</a:t>
+            </a:r>
+            <a:r>
+              <a:rPr lang="en-US" sz="2800" dirty="0"/>
+              <a:t>.</a:t>
+            </a:r>
+          </a:p>
+        </p:txBody>
+      </p:sp>
+      <p:sp>
+        <p:nvSpPr>
+          <p:cNvPr id="3" name="Marcador de contenido 2">
+            <a:extLst>
+              <a:ext uri="{FF2B5EF4-FFF2-40B4-BE49-F238E27FC236}">
+                <a16:creationId xmlns:a16="http://schemas.microsoft.com/office/drawing/2014/main" id="{B89627AA-54B2-4C03-A0CD-56339382E066}"/>
+              </a:ext>
+            </a:extLst>
+          </p:cNvPr>
+          <p:cNvSpPr>
+            <a:spLocks noGrp="1"/>
+          </p:cNvSpPr>
+          <p:nvPr>
+            <p:ph sz="half" idx="1"/>
+          </p:nvPr>
+        </p:nvSpPr>
+        <p:spPr>
+          <a:xfrm>
+            <a:off x="643191" y="2189921"/>
+            <a:ext cx="3643674" cy="3216276"/>
+          </a:xfrm>
+        </p:spPr>
+        <p:txBody>
+          <a:bodyPr vert="horz" lIns="91440" tIns="45720" rIns="91440" bIns="45720" rtlCol="0" anchor="ctr">
+            <a:normAutofit lnSpcReduction="10000"/>
+          </a:bodyPr>
+          <a:lstStyle/>
+          <a:p>
+            <a:r>
+              <a:rPr lang="en-US" dirty="0"/>
+              <a:t>Una </a:t>
+            </a:r>
+            <a:r>
+              <a:rPr lang="en-US" dirty="0" err="1"/>
+              <a:t>vez</a:t>
+            </a:r>
+            <a:r>
+              <a:rPr lang="en-US" dirty="0"/>
+              <a:t> que </a:t>
+            </a:r>
+            <a:r>
+              <a:rPr lang="en-US" dirty="0" err="1"/>
+              <a:t>ya</a:t>
+            </a:r>
+            <a:r>
+              <a:rPr lang="en-US" dirty="0"/>
+              <a:t> </a:t>
+            </a:r>
+            <a:r>
+              <a:rPr lang="en-US" dirty="0" err="1"/>
+              <a:t>tenemos</a:t>
+            </a:r>
+            <a:r>
+              <a:rPr lang="en-US" dirty="0"/>
+              <a:t> </a:t>
+            </a:r>
+            <a:r>
+              <a:rPr lang="en-US" dirty="0" err="1"/>
+              <a:t>nuestro</a:t>
+            </a:r>
+            <a:r>
+              <a:rPr lang="en-US" dirty="0"/>
+              <a:t> </a:t>
+            </a:r>
+            <a:r>
+              <a:rPr lang="en-US" dirty="0" err="1"/>
+              <a:t>marcador</a:t>
+            </a:r>
+            <a:r>
+              <a:rPr lang="en-US" dirty="0"/>
+              <a:t> de </a:t>
+            </a:r>
+            <a:r>
+              <a:rPr lang="en-US" dirty="0" err="1"/>
+              <a:t>pulsos</a:t>
+            </a:r>
+            <a:r>
+              <a:rPr lang="en-US" dirty="0"/>
+              <a:t>, lo que </a:t>
+            </a:r>
+            <a:r>
+              <a:rPr lang="en-US" dirty="0" err="1"/>
+              <a:t>hacemos</a:t>
+            </a:r>
+            <a:r>
+              <a:rPr lang="en-US" dirty="0"/>
+              <a:t> </a:t>
+            </a:r>
+            <a:r>
+              <a:rPr lang="en-US" dirty="0" err="1"/>
+              <a:t>es</a:t>
+            </a:r>
+            <a:r>
+              <a:rPr lang="en-US" dirty="0"/>
+              <a:t>, entre </a:t>
+            </a:r>
+            <a:r>
+              <a:rPr lang="en-US" dirty="0" err="1"/>
+              <a:t>pulso</a:t>
+            </a:r>
+            <a:r>
+              <a:rPr lang="en-US" dirty="0"/>
+              <a:t> y </a:t>
+            </a:r>
+            <a:r>
+              <a:rPr lang="en-US" dirty="0" err="1"/>
+              <a:t>pulso</a:t>
+            </a:r>
+            <a:r>
+              <a:rPr lang="en-US" dirty="0"/>
+              <a:t>, </a:t>
+            </a:r>
+            <a:r>
+              <a:rPr lang="en-US" dirty="0" err="1"/>
+              <a:t>realizar</a:t>
+            </a:r>
+            <a:r>
+              <a:rPr lang="en-US" dirty="0"/>
+              <a:t> las </a:t>
+            </a:r>
+            <a:r>
+              <a:rPr lang="en-US" dirty="0" err="1"/>
+              <a:t>acciones</a:t>
+            </a:r>
+            <a:r>
+              <a:rPr lang="en-US" dirty="0"/>
+              <a:t> </a:t>
+            </a:r>
+            <a:r>
+              <a:rPr lang="en-US" dirty="0" err="1"/>
+              <a:t>propias</a:t>
+            </a:r>
+            <a:r>
+              <a:rPr lang="en-US" dirty="0"/>
+              <a:t> del </a:t>
+            </a:r>
+            <a:r>
+              <a:rPr lang="en-US" dirty="0" err="1"/>
+              <a:t>juego</a:t>
+            </a:r>
+            <a:r>
+              <a:rPr lang="en-US" dirty="0"/>
+              <a:t> </a:t>
+            </a:r>
+            <a:r>
+              <a:rPr lang="en-US" dirty="0" err="1"/>
+              <a:t>como</a:t>
+            </a:r>
+            <a:r>
+              <a:rPr lang="en-US" dirty="0"/>
+              <a:t> son: </a:t>
+            </a:r>
+          </a:p>
+          <a:p>
+            <a:pPr lvl="1"/>
+            <a:r>
+              <a:rPr lang="en-US" dirty="0" err="1"/>
+              <a:t>actualizar</a:t>
+            </a:r>
+            <a:r>
+              <a:rPr lang="en-US" dirty="0"/>
+              <a:t> la </a:t>
+            </a:r>
+            <a:r>
+              <a:rPr lang="en-US" dirty="0" err="1"/>
+              <a:t>posición</a:t>
+            </a:r>
+            <a:r>
+              <a:rPr lang="en-US" dirty="0"/>
+              <a:t> de </a:t>
+            </a:r>
+            <a:r>
+              <a:rPr lang="en-US" dirty="0" err="1"/>
+              <a:t>los</a:t>
+            </a:r>
+            <a:r>
+              <a:rPr lang="en-US" dirty="0"/>
+              <a:t> </a:t>
+            </a:r>
+            <a:r>
+              <a:rPr lang="en-US" dirty="0" err="1"/>
+              <a:t>actores</a:t>
+            </a:r>
+            <a:endParaRPr lang="en-US" dirty="0"/>
+          </a:p>
+          <a:p>
+            <a:pPr lvl="1"/>
+            <a:r>
+              <a:rPr lang="en-US" dirty="0" err="1"/>
+              <a:t>comprobar</a:t>
+            </a:r>
+            <a:r>
+              <a:rPr lang="en-US" dirty="0"/>
+              <a:t> las </a:t>
+            </a:r>
+            <a:r>
+              <a:rPr lang="en-US" dirty="0" err="1"/>
+              <a:t>interacciones</a:t>
+            </a:r>
+            <a:r>
+              <a:rPr lang="en-US" dirty="0"/>
+              <a:t> entre </a:t>
+            </a:r>
+            <a:r>
+              <a:rPr lang="en-US" dirty="0" err="1"/>
+              <a:t>ellos</a:t>
+            </a:r>
+            <a:r>
+              <a:rPr lang="en-US" dirty="0"/>
+              <a:t> y </a:t>
+            </a:r>
+            <a:r>
+              <a:rPr lang="en-US" dirty="0" err="1"/>
+              <a:t>llevar</a:t>
+            </a:r>
+            <a:r>
+              <a:rPr lang="en-US" dirty="0"/>
+              <a:t> a </a:t>
+            </a:r>
+            <a:r>
+              <a:rPr lang="en-US" dirty="0" err="1"/>
+              <a:t>cabo</a:t>
+            </a:r>
+            <a:r>
+              <a:rPr lang="en-US" dirty="0"/>
+              <a:t> la </a:t>
+            </a:r>
+            <a:r>
+              <a:rPr lang="en-US" dirty="0" err="1"/>
+              <a:t>lógica</a:t>
+            </a:r>
+            <a:r>
+              <a:rPr lang="en-US" dirty="0"/>
+              <a:t> de </a:t>
+            </a:r>
+            <a:r>
+              <a:rPr lang="en-US" dirty="0" err="1"/>
+              <a:t>negocio</a:t>
+            </a:r>
+            <a:r>
+              <a:rPr lang="en-US" dirty="0"/>
+              <a:t> </a:t>
+            </a:r>
+            <a:r>
+              <a:rPr lang="en-US" dirty="0" err="1"/>
+              <a:t>correspondiente</a:t>
+            </a:r>
+            <a:r>
+              <a:rPr lang="en-US" dirty="0"/>
+              <a:t>.</a:t>
+            </a:r>
+          </a:p>
+        </p:txBody>
+      </p:sp>
+    </p:spTree>
+    <p:extLst>
+      <p:ext uri="{BB962C8B-B14F-4D97-AF65-F5344CB8AC3E}">
+        <p14:creationId xmlns:p14="http://schemas.microsoft.com/office/powerpoint/2010/main" val="3202661033"/>
+      </p:ext>
+    </p:extLst>
+  </p:cSld>
+  <p:clrMapOvr>
+    <a:masterClrMapping/>
+  </p:clrMapOvr>
+</p:sld>
+</file>
+
+<file path=ppt/slides/slide7.xml><?xml version="1.0" encoding="utf-8"?>
+<p:sld xmlns:a="http://schemas.openxmlformats.org/drawingml/2006/main" xmlns:r="http://schemas.openxmlformats.org/officeDocument/2006/relationships" xmlns:p="http://schemas.openxmlformats.org/presentationml/2006/main">
+  <p:cSld>
+    <p:bg>
+      <p:bgPr>
+        <a:blipFill rotWithShape="1">
+          <a:blip r:embed="rId2">
+            <a:duotone>
+              <a:schemeClr val="bg2">
+                <a:shade val="28000"/>
+                <a:satMod val="94000"/>
+                <a:lumMod val="20000"/>
+              </a:schemeClr>
+              <a:schemeClr val="bg2">
+                <a:tint val="94000"/>
+                <a:shade val="84000"/>
+                <a:satMod val="148000"/>
+                <a:lumMod val="114000"/>
+              </a:schemeClr>
+            </a:duotone>
+            <a:extLst/>
+          </a:blip>
+          <a:stretch/>
+        </a:blipFill>
+        <a:effectLst/>
+      </p:bgPr>
+    </p:bg>
+    <p:spTree>
+      <p:nvGrpSpPr>
+        <p:cNvPr id="1" name=""/>
+        <p:cNvGrpSpPr/>
+        <p:nvPr/>
+      </p:nvGrpSpPr>
+      <p:grpSpPr>
+        <a:xfrm>
+          <a:off x="0" y="0"/>
+          <a:ext cx="0" cy="0"/>
+          <a:chOff x="0" y="0"/>
+          <a:chExt cx="0" cy="0"/>
+        </a:xfrm>
+      </p:grpSpPr>
+      <p:pic>
+        <p:nvPicPr>
+          <p:cNvPr id="5" name="Marcador de contenido 4" descr="Imagen que contiene captura de pantalla&#10;&#10;Descripción generada con confianza muy alta">
+            <a:extLst>
+              <a:ext uri="{FF2B5EF4-FFF2-40B4-BE49-F238E27FC236}">
+                <a16:creationId xmlns:a16="http://schemas.microsoft.com/office/drawing/2014/main" id="{5CEE0CDF-CBFA-4193-B1ED-7D6959600DDB}"/>
+              </a:ext>
+            </a:extLst>
+          </p:cNvPr>
+          <p:cNvPicPr>
+            <a:picLocks noGrp="1" noChangeAspect="1"/>
+          </p:cNvPicPr>
+          <p:nvPr>
+            <p:ph sz="half" idx="2"/>
+          </p:nvPr>
+        </p:nvPicPr>
+        <p:blipFill>
+          <a:blip r:embed="rId3"/>
+          <a:stretch>
+            <a:fillRect/>
+          </a:stretch>
+        </p:blipFill>
+        <p:spPr>
+          <a:xfrm>
+            <a:off x="4869833" y="645106"/>
+            <a:ext cx="6438955" cy="5247747"/>
+          </a:xfrm>
+          <a:prstGeom prst="roundRect">
+            <a:avLst>
+              <a:gd name="adj" fmla="val 3517"/>
+            </a:avLst>
+          </a:prstGeom>
+          <a:ln w="38100">
+            <a:gradFill flip="none" rotWithShape="1">
+              <a:gsLst>
+                <a:gs pos="0">
+                  <a:srgbClr val="363D46"/>
+                </a:gs>
+                <a:gs pos="100000">
+                  <a:srgbClr val="363D46">
+                    <a:lumMod val="75000"/>
+                  </a:srgbClr>
+                </a:gs>
+              </a:gsLst>
+              <a:lin ang="5400000" scaled="0"/>
+              <a:tileRect/>
+            </a:gradFill>
+          </a:ln>
+          <a:effectLst>
+            <a:innerShdw blurRad="57150" dist="38100" dir="14460000">
+              <a:srgbClr val="000000">
+                <a:alpha val="70000"/>
+              </a:srgbClr>
+            </a:innerShdw>
+          </a:effectLst>
+        </p:spPr>
+      </p:pic>
+      <p:sp>
+        <p:nvSpPr>
+          <p:cNvPr id="2" name="Título 1">
+            <a:extLst>
+              <a:ext uri="{FF2B5EF4-FFF2-40B4-BE49-F238E27FC236}">
+                <a16:creationId xmlns:a16="http://schemas.microsoft.com/office/drawing/2014/main" id="{7AA2035F-2500-4DE4-AC3C-77FF2C835D0D}"/>
+              </a:ext>
+            </a:extLst>
+          </p:cNvPr>
+          <p:cNvSpPr>
+            <a:spLocks noGrp="1"/>
+          </p:cNvSpPr>
+          <p:nvPr>
+            <p:ph type="title"/>
+          </p:nvPr>
+        </p:nvSpPr>
+        <p:spPr>
+          <a:xfrm>
+            <a:off x="643192" y="609600"/>
+            <a:ext cx="3643674" cy="1905000"/>
+          </a:xfrm>
+        </p:spPr>
+        <p:txBody>
+          <a:bodyPr vert="horz" lIns="91440" tIns="45720" rIns="91440" bIns="45720" rtlCol="0" anchor="ctr">
+            <a:normAutofit/>
+          </a:bodyPr>
+          <a:lstStyle/>
+          <a:p>
+            <a:r>
+              <a:rPr lang="en-US" sz="2800"/>
+              <a:t>El movimiento y las interacciones.</a:t>
+            </a:r>
+          </a:p>
+        </p:txBody>
+      </p:sp>
+      <p:sp>
+        <p:nvSpPr>
+          <p:cNvPr id="3" name="Marcador de contenido 2">
+            <a:extLst>
+              <a:ext uri="{FF2B5EF4-FFF2-40B4-BE49-F238E27FC236}">
+                <a16:creationId xmlns:a16="http://schemas.microsoft.com/office/drawing/2014/main" id="{B89627AA-54B2-4C03-A0CD-56339382E066}"/>
+              </a:ext>
+            </a:extLst>
+          </p:cNvPr>
+          <p:cNvSpPr>
+            <a:spLocks noGrp="1"/>
+          </p:cNvSpPr>
+          <p:nvPr>
+            <p:ph sz="half" idx="1"/>
+          </p:nvPr>
+        </p:nvSpPr>
+        <p:spPr>
+          <a:xfrm>
+            <a:off x="643191" y="2305878"/>
+            <a:ext cx="4048079" cy="3723861"/>
+          </a:xfrm>
+        </p:spPr>
+        <p:txBody>
+          <a:bodyPr vert="horz" lIns="91440" tIns="45720" rIns="91440" bIns="45720" rtlCol="0" anchor="ctr">
+            <a:normAutofit/>
+          </a:bodyPr>
+          <a:lstStyle/>
+          <a:p>
+            <a:pPr fontAlgn="base">
+              <a:lnSpc>
+                <a:spcPct val="90000"/>
+              </a:lnSpc>
+            </a:pPr>
+            <a:r>
+              <a:rPr lang="en-US" sz="1600" dirty="0"/>
+              <a:t>Para </a:t>
+            </a:r>
+            <a:r>
+              <a:rPr lang="en-US" sz="1600" dirty="0" err="1"/>
+              <a:t>comprobar</a:t>
+            </a:r>
+            <a:r>
+              <a:rPr lang="en-US" sz="1600" dirty="0"/>
+              <a:t> las </a:t>
+            </a:r>
+            <a:r>
+              <a:rPr lang="en-US" sz="1600" dirty="0" err="1"/>
+              <a:t>interacciones</a:t>
+            </a:r>
+            <a:r>
+              <a:rPr lang="en-US" sz="1600" dirty="0"/>
+              <a:t> y </a:t>
+            </a:r>
+            <a:r>
+              <a:rPr lang="en-US" sz="1600" dirty="0" err="1"/>
+              <a:t>actualizar</a:t>
+            </a:r>
+            <a:r>
+              <a:rPr lang="en-US" sz="1600" dirty="0"/>
+              <a:t> a </a:t>
+            </a:r>
+            <a:r>
+              <a:rPr lang="en-US" sz="1600" dirty="0" err="1"/>
+              <a:t>los</a:t>
+            </a:r>
+            <a:r>
+              <a:rPr lang="en-US" sz="1600" dirty="0"/>
+              <a:t> </a:t>
+            </a:r>
+            <a:r>
+              <a:rPr lang="en-US" sz="1600" dirty="0" err="1"/>
+              <a:t>actores</a:t>
+            </a:r>
+            <a:r>
+              <a:rPr lang="en-US" sz="1600" dirty="0"/>
+              <a:t> </a:t>
+            </a:r>
+            <a:r>
+              <a:rPr lang="en-US" sz="1600" dirty="0" err="1"/>
+              <a:t>usamos</a:t>
+            </a:r>
+            <a:r>
+              <a:rPr lang="en-US" sz="1600" dirty="0"/>
+              <a:t> el </a:t>
+            </a:r>
+            <a:r>
+              <a:rPr lang="en-US" sz="1600" dirty="0" err="1"/>
+              <a:t>método</a:t>
+            </a:r>
+            <a:r>
+              <a:rPr lang="en-US" sz="1600" dirty="0"/>
+              <a:t> update que </a:t>
+            </a:r>
+            <a:r>
+              <a:rPr lang="en-US" sz="1600" dirty="0" err="1"/>
+              <a:t>comprobará</a:t>
+            </a:r>
+            <a:r>
+              <a:rPr lang="en-US" sz="1600" dirty="0"/>
+              <a:t> </a:t>
+            </a:r>
+            <a:r>
+              <a:rPr lang="en-US" sz="1600" dirty="0" err="1"/>
+              <a:t>cosas</a:t>
+            </a:r>
+            <a:r>
+              <a:rPr lang="en-US" sz="1600" dirty="0"/>
+              <a:t> </a:t>
+            </a:r>
+            <a:r>
+              <a:rPr lang="en-US" sz="1600" dirty="0" err="1"/>
+              <a:t>necesarias</a:t>
+            </a:r>
+            <a:r>
+              <a:rPr lang="en-US" sz="1600" dirty="0"/>
+              <a:t> </a:t>
+            </a:r>
+            <a:r>
+              <a:rPr lang="en-US" sz="1600" dirty="0" err="1"/>
+              <a:t>en</a:t>
+            </a:r>
+            <a:r>
+              <a:rPr lang="en-US" sz="1600" dirty="0"/>
+              <a:t> </a:t>
+            </a:r>
+            <a:r>
+              <a:rPr lang="en-US" sz="1600" dirty="0" err="1"/>
+              <a:t>cada</a:t>
+            </a:r>
+            <a:r>
+              <a:rPr lang="en-US" sz="1600" dirty="0"/>
+              <a:t> </a:t>
+            </a:r>
+            <a:r>
+              <a:rPr lang="en-US" sz="1600" dirty="0" err="1"/>
+              <a:t>pulso</a:t>
+            </a:r>
+            <a:r>
+              <a:rPr lang="en-US" sz="1600" dirty="0"/>
+              <a:t> </a:t>
+            </a:r>
+            <a:r>
+              <a:rPr lang="en-US" sz="1600" dirty="0" err="1"/>
+              <a:t>como</a:t>
+            </a:r>
+            <a:r>
+              <a:rPr lang="en-US" sz="1600" dirty="0"/>
+              <a:t> </a:t>
+            </a:r>
+            <a:r>
+              <a:rPr lang="en-US" sz="1600" dirty="0" err="1"/>
+              <a:t>son:Si</a:t>
+            </a:r>
+            <a:r>
+              <a:rPr lang="en-US" sz="1600" dirty="0"/>
+              <a:t> </a:t>
+            </a:r>
+            <a:r>
+              <a:rPr lang="en-US" sz="1600" dirty="0" err="1"/>
+              <a:t>nos</a:t>
+            </a:r>
+            <a:r>
+              <a:rPr lang="en-US" sz="1600" dirty="0"/>
+              <a:t> </a:t>
+            </a:r>
+            <a:r>
+              <a:rPr lang="en-US" sz="1600" dirty="0" err="1"/>
+              <a:t>han</a:t>
+            </a:r>
+            <a:r>
+              <a:rPr lang="en-US" sz="1600" dirty="0"/>
+              <a:t> </a:t>
+            </a:r>
+            <a:r>
+              <a:rPr lang="en-US" sz="1600" dirty="0" err="1"/>
+              <a:t>matado</a:t>
+            </a:r>
+            <a:endParaRPr lang="en-US" sz="1600" dirty="0"/>
+          </a:p>
+          <a:p>
+            <a:pPr fontAlgn="base">
+              <a:lnSpc>
+                <a:spcPct val="90000"/>
+              </a:lnSpc>
+            </a:pPr>
+            <a:r>
+              <a:rPr lang="en-US" sz="1600" dirty="0"/>
+              <a:t>Si </a:t>
+            </a:r>
+            <a:r>
+              <a:rPr lang="en-US" sz="1600" dirty="0" err="1"/>
+              <a:t>nos</a:t>
+            </a:r>
+            <a:r>
+              <a:rPr lang="en-US" sz="1600" dirty="0"/>
+              <a:t> </a:t>
+            </a:r>
+            <a:r>
+              <a:rPr lang="en-US" sz="1600" dirty="0" err="1"/>
+              <a:t>hemos</a:t>
+            </a:r>
+            <a:r>
+              <a:rPr lang="en-US" sz="1600" dirty="0"/>
+              <a:t> </a:t>
+            </a:r>
+            <a:r>
+              <a:rPr lang="en-US" sz="1600" dirty="0" err="1"/>
+              <a:t>pasado</a:t>
+            </a:r>
+            <a:r>
+              <a:rPr lang="en-US" sz="1600" dirty="0"/>
+              <a:t> el </a:t>
+            </a:r>
+            <a:r>
+              <a:rPr lang="en-US" sz="1600" dirty="0" err="1"/>
+              <a:t>juego</a:t>
+            </a:r>
+            <a:endParaRPr lang="en-US" sz="1600" dirty="0"/>
+          </a:p>
+          <a:p>
+            <a:pPr fontAlgn="base">
+              <a:lnSpc>
+                <a:spcPct val="90000"/>
+              </a:lnSpc>
+            </a:pPr>
+            <a:r>
+              <a:rPr lang="en-US" sz="1600" dirty="0"/>
+              <a:t>Si </a:t>
+            </a:r>
+            <a:r>
+              <a:rPr lang="en-US" sz="1600" dirty="0" err="1"/>
+              <a:t>nos</a:t>
+            </a:r>
+            <a:r>
+              <a:rPr lang="en-US" sz="1600" dirty="0"/>
+              <a:t> ha dado un </a:t>
+            </a:r>
+            <a:r>
+              <a:rPr lang="en-US" sz="1600" dirty="0" err="1"/>
+              <a:t>disparo</a:t>
+            </a:r>
+            <a:endParaRPr lang="en-US" sz="1600" dirty="0"/>
+          </a:p>
+          <a:p>
+            <a:pPr fontAlgn="base">
+              <a:lnSpc>
+                <a:spcPct val="90000"/>
+              </a:lnSpc>
+            </a:pPr>
+            <a:r>
+              <a:rPr lang="en-US" sz="1600" dirty="0"/>
+              <a:t>Si </a:t>
+            </a:r>
+            <a:r>
+              <a:rPr lang="en-US" sz="1600" dirty="0" err="1"/>
+              <a:t>hemos</a:t>
+            </a:r>
+            <a:r>
+              <a:rPr lang="en-US" sz="1600" dirty="0"/>
+              <a:t> dado al </a:t>
+            </a:r>
+            <a:r>
+              <a:rPr lang="en-US" sz="1600" dirty="0" err="1"/>
+              <a:t>malo</a:t>
+            </a:r>
+            <a:endParaRPr lang="en-US" sz="1600" dirty="0"/>
+          </a:p>
+          <a:p>
+            <a:pPr fontAlgn="base">
+              <a:lnSpc>
+                <a:spcPct val="90000"/>
+              </a:lnSpc>
+            </a:pPr>
+            <a:r>
+              <a:rPr lang="en-US" sz="1600" dirty="0"/>
+              <a:t>Si el </a:t>
+            </a:r>
+            <a:r>
+              <a:rPr lang="en-US" sz="1600" dirty="0" err="1"/>
+              <a:t>jugador</a:t>
+            </a:r>
+            <a:r>
+              <a:rPr lang="en-US" sz="1600" dirty="0"/>
+              <a:t> </a:t>
+            </a:r>
+            <a:r>
+              <a:rPr lang="en-US" sz="1600" dirty="0" err="1"/>
+              <a:t>está</a:t>
+            </a:r>
+            <a:r>
+              <a:rPr lang="en-US" sz="1600" dirty="0"/>
+              <a:t> </a:t>
+            </a:r>
+            <a:r>
+              <a:rPr lang="en-US" sz="1600" dirty="0" err="1"/>
+              <a:t>pidiendo</a:t>
+            </a:r>
+            <a:r>
+              <a:rPr lang="en-US" sz="1600" dirty="0"/>
+              <a:t> al avatar que se </a:t>
+            </a:r>
+            <a:r>
+              <a:rPr lang="en-US" sz="1600" dirty="0" err="1"/>
+              <a:t>mueva</a:t>
+            </a:r>
+            <a:r>
+              <a:rPr lang="en-US" sz="1600" dirty="0"/>
+              <a:t> o que </a:t>
+            </a:r>
+            <a:r>
+              <a:rPr lang="en-US" sz="1600" dirty="0" err="1"/>
+              <a:t>dispare</a:t>
+            </a:r>
+            <a:r>
+              <a:rPr lang="en-US" sz="1600" dirty="0"/>
+              <a:t> </a:t>
+            </a:r>
+            <a:r>
+              <a:rPr lang="en-US" sz="1600" dirty="0" err="1"/>
+              <a:t>mediante</a:t>
+            </a:r>
+            <a:r>
+              <a:rPr lang="en-US" sz="1600" dirty="0"/>
+              <a:t> la </a:t>
+            </a:r>
+            <a:r>
+              <a:rPr lang="en-US" sz="1600" dirty="0" err="1"/>
+              <a:t>pulsación</a:t>
+            </a:r>
+            <a:r>
+              <a:rPr lang="en-US" sz="1600" dirty="0"/>
+              <a:t> de las </a:t>
+            </a:r>
+            <a:r>
+              <a:rPr lang="en-US" sz="1600" dirty="0" err="1"/>
+              <a:t>teclas</a:t>
+            </a:r>
+            <a:endParaRPr lang="en-US" sz="1600" dirty="0"/>
+          </a:p>
+          <a:p>
+            <a:pPr>
+              <a:lnSpc>
+                <a:spcPct val="90000"/>
+              </a:lnSpc>
+            </a:pPr>
+            <a:endParaRPr lang="en-US" sz="1500" dirty="0"/>
+          </a:p>
+        </p:txBody>
+      </p:sp>
+    </p:spTree>
+    <p:extLst>
+      <p:ext uri="{BB962C8B-B14F-4D97-AF65-F5344CB8AC3E}">
+        <p14:creationId xmlns:p14="http://schemas.microsoft.com/office/powerpoint/2010/main" val="2706774106"/>
+      </p:ext>
+    </p:extLst>
+  </p:cSld>
+  <p:clrMapOvr>
+    <a:masterClrMapping/>
+  </p:clrMapOvr>
+</p:sld>
+</file>
+
+<file path=ppt/slides/slide8.xml><?xml version="1.0" encoding="utf-8"?>
+<p:sld xmlns:a="http://schemas.openxmlformats.org/drawingml/2006/main" xmlns:r="http://schemas.openxmlformats.org/officeDocument/2006/relationships" xmlns:p="http://schemas.openxmlformats.org/presentationml/2006/main">
+  <p:cSld>
+    <p:bg>
+      <p:bgPr>
+        <a:blipFill rotWithShape="1">
+          <a:blip r:embed="rId2">
+            <a:duotone>
+              <a:schemeClr val="bg2">
+                <a:shade val="28000"/>
+                <a:satMod val="94000"/>
+                <a:lumMod val="20000"/>
+              </a:schemeClr>
+              <a:schemeClr val="bg2">
+                <a:tint val="94000"/>
+                <a:shade val="84000"/>
+                <a:satMod val="148000"/>
+                <a:lumMod val="114000"/>
+              </a:schemeClr>
+            </a:duotone>
+            <a:extLst/>
+          </a:blip>
+          <a:stretch/>
+        </a:blipFill>
+        <a:effectLst/>
+      </p:bgPr>
+    </p:bg>
+    <p:spTree>
+      <p:nvGrpSpPr>
+        <p:cNvPr id="1" name=""/>
+        <p:cNvGrpSpPr/>
+        <p:nvPr/>
+      </p:nvGrpSpPr>
+      <p:grpSpPr>
+        <a:xfrm>
+          <a:off x="0" y="0"/>
+          <a:ext cx="0" cy="0"/>
+          <a:chOff x="0" y="0"/>
+          <a:chExt cx="0" cy="0"/>
+        </a:xfrm>
+      </p:grpSpPr>
+      <p:pic>
+        <p:nvPicPr>
+          <p:cNvPr id="5" name="Marcador de contenido 4" descr="Imagen que contiene texto, captura de pantalla&#10;&#10;Descripción generada con confianza alta">
+            <a:extLst>
+              <a:ext uri="{FF2B5EF4-FFF2-40B4-BE49-F238E27FC236}">
+                <a16:creationId xmlns:a16="http://schemas.microsoft.com/office/drawing/2014/main" id="{BCF128AE-671B-4718-A70D-2E06FB849A03}"/>
+              </a:ext>
+            </a:extLst>
+          </p:cNvPr>
+          <p:cNvPicPr>
+            <a:picLocks noGrp="1" noChangeAspect="1"/>
+          </p:cNvPicPr>
+          <p:nvPr>
+            <p:ph sz="half" idx="2"/>
+          </p:nvPr>
+        </p:nvPicPr>
+        <p:blipFill rotWithShape="1">
+          <a:blip r:embed="rId3"/>
+          <a:srcRect t="14536" r="1" b="28371"/>
+          <a:stretch/>
+        </p:blipFill>
+        <p:spPr>
+          <a:xfrm>
+            <a:off x="4630994" y="645106"/>
+            <a:ext cx="6916633" cy="5247747"/>
+          </a:xfrm>
+          <a:prstGeom prst="roundRect">
+            <a:avLst>
+              <a:gd name="adj" fmla="val 3517"/>
+            </a:avLst>
+          </a:prstGeom>
+          <a:ln w="38100">
+            <a:gradFill flip="none" rotWithShape="1">
+              <a:gsLst>
+                <a:gs pos="0">
+                  <a:srgbClr val="363D46"/>
+                </a:gs>
+                <a:gs pos="100000">
+                  <a:srgbClr val="363D46">
+                    <a:lumMod val="75000"/>
+                  </a:srgbClr>
+                </a:gs>
+              </a:gsLst>
+              <a:lin ang="5400000" scaled="0"/>
+              <a:tileRect/>
+            </a:gradFill>
+          </a:ln>
+          <a:effectLst>
+            <a:innerShdw blurRad="57150" dist="38100" dir="14460000">
+              <a:srgbClr val="000000">
+                <a:alpha val="70000"/>
+              </a:srgbClr>
+            </a:innerShdw>
+          </a:effectLst>
+        </p:spPr>
+      </p:pic>
+      <p:sp>
+        <p:nvSpPr>
+          <p:cNvPr id="2" name="Título 1">
+            <a:extLst>
+              <a:ext uri="{FF2B5EF4-FFF2-40B4-BE49-F238E27FC236}">
+                <a16:creationId xmlns:a16="http://schemas.microsoft.com/office/drawing/2014/main" id="{64604613-728D-43BF-8BDB-A05AC148220D}"/>
+              </a:ext>
+            </a:extLst>
+          </p:cNvPr>
+          <p:cNvSpPr>
+            <a:spLocks noGrp="1"/>
+          </p:cNvSpPr>
+          <p:nvPr>
+            <p:ph type="title"/>
+          </p:nvPr>
+        </p:nvSpPr>
+        <p:spPr>
+          <a:xfrm>
+            <a:off x="643192" y="609600"/>
+            <a:ext cx="3643674" cy="1905000"/>
+          </a:xfrm>
+        </p:spPr>
+        <p:txBody>
+          <a:bodyPr vert="horz" lIns="91440" tIns="45720" rIns="91440" bIns="45720" rtlCol="0" anchor="ctr">
+            <a:normAutofit/>
+          </a:bodyPr>
+          <a:lstStyle/>
+          <a:p>
+            <a:r>
+              <a:rPr lang="en-US" sz="2800"/>
+              <a:t>Los controles</a:t>
+            </a:r>
+          </a:p>
+        </p:txBody>
+      </p:sp>
+      <p:sp>
+        <p:nvSpPr>
+          <p:cNvPr id="3" name="Marcador de contenido 2">
+            <a:extLst>
+              <a:ext uri="{FF2B5EF4-FFF2-40B4-BE49-F238E27FC236}">
+                <a16:creationId xmlns:a16="http://schemas.microsoft.com/office/drawing/2014/main" id="{4FF4768A-41BA-4694-8031-E3BCE2A0159D}"/>
+              </a:ext>
+            </a:extLst>
+          </p:cNvPr>
+          <p:cNvSpPr>
+            <a:spLocks noGrp="1"/>
+          </p:cNvSpPr>
+          <p:nvPr>
+            <p:ph sz="half" idx="1"/>
+          </p:nvPr>
+        </p:nvSpPr>
+        <p:spPr>
+          <a:xfrm>
+            <a:off x="643192" y="1961322"/>
+            <a:ext cx="3643674" cy="3921953"/>
+          </a:xfrm>
+        </p:spPr>
+        <p:txBody>
+          <a:bodyPr vert="horz" lIns="91440" tIns="45720" rIns="91440" bIns="45720" rtlCol="0" anchor="ctr">
+            <a:normAutofit fontScale="85000" lnSpcReduction="10000"/>
+          </a:bodyPr>
+          <a:lstStyle/>
+          <a:p>
+            <a:pPr lvl="0"/>
+            <a:r>
+              <a:rPr lang="es-EC" dirty="0">
+                <a:effectLst/>
+              </a:rPr>
+              <a:t>Como vimos en los puntos anteriores, el juego se actualiza en base a unos pulsos. Por tanto, debemos comprobar durante cada pulso si el usuario está presionando alguna de las teclas que manejan a la medusa para que ésta actúe en consecuencia con la orden que se le está transmitiendo. </a:t>
+            </a:r>
+          </a:p>
+          <a:p>
+            <a:pPr lvl="0"/>
+            <a:r>
+              <a:rPr lang="es-EC" dirty="0">
+                <a:effectLst/>
+              </a:rPr>
+              <a:t>El método “</a:t>
+            </a:r>
+            <a:r>
+              <a:rPr lang="es-EC" dirty="0" err="1">
+                <a:effectLst/>
+              </a:rPr>
+              <a:t>doAnything</a:t>
+            </a:r>
+            <a:r>
+              <a:rPr lang="es-EC" dirty="0">
+                <a:effectLst/>
+              </a:rPr>
+              <a:t>” del objeto “Player” que vimos en la representación de los Actores será el encargado de llevar a cabo la orden del usuario y la función “</a:t>
+            </a:r>
+            <a:r>
+              <a:rPr lang="es-EC" dirty="0" err="1">
+                <a:effectLst/>
+              </a:rPr>
+              <a:t>playerAction</a:t>
+            </a:r>
+            <a:r>
+              <a:rPr lang="es-EC" dirty="0">
+                <a:effectLst/>
+              </a:rPr>
+              <a:t>”, que se invoca desde la función “</a:t>
+            </a:r>
+            <a:r>
+              <a:rPr lang="es-EC" dirty="0" err="1">
+                <a:effectLst/>
+              </a:rPr>
+              <a:t>update</a:t>
+            </a:r>
+            <a:r>
+              <a:rPr lang="es-EC" dirty="0">
+                <a:effectLst/>
+              </a:rPr>
+              <a:t>” que vimos anteriormente será la encargada de invocarlo en cada pulso.</a:t>
+            </a:r>
+          </a:p>
+        </p:txBody>
+      </p:sp>
+    </p:spTree>
+    <p:extLst>
+      <p:ext uri="{BB962C8B-B14F-4D97-AF65-F5344CB8AC3E}">
+        <p14:creationId xmlns:p14="http://schemas.microsoft.com/office/powerpoint/2010/main" val="3020304139"/>
+      </p:ext>
+    </p:extLst>
+  </p:cSld>
+  <p:clrMapOvr>
+    <a:masterClrMapping/>
+  </p:clrMapOvr>
+</p:sld>
+</file>
+
+<file path=ppt/slides/slide9.xml><?xml version="1.0" encoding="utf-8"?>
+<p:sld xmlns:a="http://schemas.openxmlformats.org/drawingml/2006/main" xmlns:r="http://schemas.openxmlformats.org/officeDocument/2006/relationships" xmlns:p="http://schemas.openxmlformats.org/presentationml/2006/main">
+  <p:cSld>
+    <p:bg>
+      <p:bgPr>
+        <a:blipFill rotWithShape="1">
+          <a:blip r:embed="rId2">
+            <a:duotone>
+              <a:schemeClr val="bg2">
+                <a:shade val="28000"/>
+                <a:satMod val="94000"/>
+                <a:lumMod val="20000"/>
+              </a:schemeClr>
+              <a:schemeClr val="bg2">
+                <a:tint val="94000"/>
+                <a:shade val="84000"/>
+                <a:satMod val="148000"/>
+                <a:lumMod val="114000"/>
+              </a:schemeClr>
+            </a:duotone>
+            <a:extLst/>
+          </a:blip>
+          <a:stretch/>
+        </a:blipFill>
+        <a:effectLst/>
+      </p:bgPr>
+    </p:bg>
+    <p:spTree>
+      <p:nvGrpSpPr>
+        <p:cNvPr id="1" name=""/>
+        <p:cNvGrpSpPr/>
+        <p:nvPr/>
+      </p:nvGrpSpPr>
+      <p:grpSpPr>
+        <a:xfrm>
+          <a:off x="0" y="0"/>
+          <a:ext cx="0" cy="0"/>
+          <a:chOff x="0" y="0"/>
+          <a:chExt cx="0" cy="0"/>
+        </a:xfrm>
+      </p:grpSpPr>
+      <p:pic>
+        <p:nvPicPr>
+          <p:cNvPr id="5" name="Marcador de contenido 4" descr="Imagen que contiene texto&#10;&#10;Descripción generada con confianza alta">
+            <a:extLst>
+              <a:ext uri="{FF2B5EF4-FFF2-40B4-BE49-F238E27FC236}">
+                <a16:creationId xmlns:a16="http://schemas.microsoft.com/office/drawing/2014/main" id="{8ACFC45B-072F-495C-85F2-16BF25D28671}"/>
+              </a:ext>
+            </a:extLst>
+          </p:cNvPr>
+          <p:cNvPicPr>
+            <a:picLocks noGrp="1" noChangeAspect="1"/>
+          </p:cNvPicPr>
+          <p:nvPr>
+            <p:ph sz="half" idx="2"/>
+          </p:nvPr>
+        </p:nvPicPr>
+        <p:blipFill>
+          <a:blip r:embed="rId3"/>
+          <a:stretch>
+            <a:fillRect/>
+          </a:stretch>
+        </p:blipFill>
+        <p:spPr>
+          <a:xfrm>
+            <a:off x="4630994" y="1280448"/>
+            <a:ext cx="6916633" cy="3977063"/>
+          </a:xfrm>
+          <a:prstGeom prst="roundRect">
+            <a:avLst>
+              <a:gd name="adj" fmla="val 3517"/>
+            </a:avLst>
+          </a:prstGeom>
+          <a:ln w="38100">
+            <a:gradFill flip="none" rotWithShape="1">
+              <a:gsLst>
+                <a:gs pos="0">
+                  <a:srgbClr val="363D46"/>
+                </a:gs>
+                <a:gs pos="100000">
+                  <a:srgbClr val="363D46">
+                    <a:lumMod val="75000"/>
+                  </a:srgbClr>
+                </a:gs>
+              </a:gsLst>
+              <a:lin ang="5400000" scaled="0"/>
+              <a:tileRect/>
+            </a:gradFill>
+          </a:ln>
+          <a:effectLst>
+            <a:innerShdw blurRad="57150" dist="38100" dir="14460000">
+              <a:srgbClr val="000000">
+                <a:alpha val="70000"/>
+              </a:srgbClr>
+            </a:innerShdw>
+          </a:effectLst>
+        </p:spPr>
+      </p:pic>
+      <p:sp>
+        <p:nvSpPr>
+          <p:cNvPr id="2" name="Título 1">
+            <a:extLst>
+              <a:ext uri="{FF2B5EF4-FFF2-40B4-BE49-F238E27FC236}">
+                <a16:creationId xmlns:a16="http://schemas.microsoft.com/office/drawing/2014/main" id="{2F6276B6-4ADA-42A2-AA71-A97AF91DE557}"/>
+              </a:ext>
+            </a:extLst>
+          </p:cNvPr>
+          <p:cNvSpPr>
+            <a:spLocks noGrp="1"/>
+          </p:cNvSpPr>
+          <p:nvPr>
+            <p:ph type="title"/>
+          </p:nvPr>
+        </p:nvSpPr>
+        <p:spPr>
+          <a:xfrm>
+            <a:off x="643192" y="609600"/>
+            <a:ext cx="3643674" cy="1905000"/>
+          </a:xfrm>
+        </p:spPr>
+        <p:txBody>
+          <a:bodyPr vert="horz" lIns="91440" tIns="45720" rIns="91440" bIns="45720" rtlCol="0" anchor="ctr">
+            <a:normAutofit/>
+          </a:bodyPr>
+          <a:lstStyle/>
+          <a:p>
+            <a:r>
+              <a:rPr lang="en-US" sz="2800"/>
+              <a:t>Guardando las mejores puntuaciones</a:t>
+            </a:r>
+          </a:p>
+        </p:txBody>
+      </p:sp>
+      <p:sp>
+        <p:nvSpPr>
+          <p:cNvPr id="3" name="Marcador de contenido 2">
+            <a:extLst>
+              <a:ext uri="{FF2B5EF4-FFF2-40B4-BE49-F238E27FC236}">
+                <a16:creationId xmlns:a16="http://schemas.microsoft.com/office/drawing/2014/main" id="{B43BDC27-9B08-4ADB-9B0E-53B78F72B325}"/>
+              </a:ext>
+            </a:extLst>
+          </p:cNvPr>
+          <p:cNvSpPr>
+            <a:spLocks noGrp="1"/>
+          </p:cNvSpPr>
+          <p:nvPr>
+            <p:ph sz="half" idx="1"/>
+          </p:nvPr>
+        </p:nvSpPr>
+        <p:spPr>
+          <a:xfrm>
+            <a:off x="516835" y="2425148"/>
+            <a:ext cx="3982278" cy="3703982"/>
+          </a:xfrm>
+        </p:spPr>
+        <p:txBody>
+          <a:bodyPr vert="horz" lIns="91440" tIns="45720" rIns="91440" bIns="45720" rtlCol="0" anchor="ctr">
+            <a:normAutofit fontScale="70000" lnSpcReduction="20000"/>
+          </a:bodyPr>
+          <a:lstStyle/>
+          <a:p>
+            <a:pPr lvl="0"/>
+            <a:r>
+              <a:rPr lang="es-EC" sz="2100" dirty="0">
+                <a:effectLst/>
+              </a:rPr>
+              <a:t>Para la representación de los puntaje haremos uso de la </a:t>
+            </a:r>
+            <a:r>
+              <a:rPr lang="es-EC" sz="2100" u="sng" dirty="0">
+                <a:effectLst/>
+                <a:hlinkClick r:id="rId4"/>
+              </a:rPr>
+              <a:t>nueva</a:t>
+            </a:r>
+            <a:r>
+              <a:rPr lang="en-US" sz="2100" u="sng" dirty="0">
+                <a:effectLst/>
+                <a:hlinkClick r:id="rId4"/>
+              </a:rPr>
+              <a:t> </a:t>
+            </a:r>
+            <a:r>
+              <a:rPr lang="es-EC" sz="2100" u="sng" dirty="0" err="1">
+                <a:effectLst/>
+                <a:hlinkClick r:id="rId4"/>
+              </a:rPr>
+              <a:t>caracterísitica</a:t>
+            </a:r>
+            <a:r>
+              <a:rPr lang="es-EC" sz="2100" u="sng" dirty="0">
+                <a:effectLst/>
+                <a:hlinkClick r:id="rId4"/>
+              </a:rPr>
+              <a:t> de HTML5 Local Storage (almacenamiento</a:t>
+            </a:r>
+            <a:r>
+              <a:rPr lang="en-US" sz="2100" u="sng" dirty="0">
+                <a:effectLst/>
+                <a:hlinkClick r:id="rId4"/>
+              </a:rPr>
+              <a:t> </a:t>
+            </a:r>
+            <a:r>
+              <a:rPr lang="es-EC" sz="2100" u="sng" dirty="0">
+                <a:effectLst/>
+                <a:hlinkClick r:id="rId4"/>
+              </a:rPr>
+              <a:t>local)</a:t>
+            </a:r>
+            <a:r>
+              <a:rPr lang="es-EC" sz="2100" dirty="0">
+                <a:effectLst/>
+              </a:rPr>
+              <a:t>. Para esto partiremos de un parámetro configurable que nos indicará el número de mejores puntuaciones que debemos mostrar al usuario: </a:t>
+            </a:r>
+          </a:p>
+          <a:p>
+            <a:pPr lvl="1"/>
+            <a:r>
+              <a:rPr lang="es-EC" sz="1800" dirty="0">
+                <a:effectLst/>
+              </a:rPr>
+              <a:t>Guardar la puntuación del jugador y la fecha y hora en la que esta se produjo.</a:t>
+            </a:r>
+          </a:p>
+          <a:p>
+            <a:pPr lvl="1"/>
+            <a:r>
+              <a:rPr lang="es-EC" sz="1800" dirty="0">
+                <a:effectLst/>
+              </a:rPr>
+              <a:t>Actualizar la lista de las X mejores puntuaciones</a:t>
+            </a:r>
+          </a:p>
+          <a:p>
+            <a:pPr lvl="1"/>
+            <a:r>
+              <a:rPr lang="es-EC" sz="1800" dirty="0">
+                <a:effectLst/>
+              </a:rPr>
+              <a:t>Eliminar las puntuaciones que no estén entre las mejores (para no almacenar datos innecesarios en el navegador)</a:t>
+            </a:r>
+          </a:p>
+          <a:p>
+            <a:pPr lvl="1"/>
+            <a:r>
+              <a:rPr lang="es-EC" sz="1800" dirty="0">
+                <a:effectLst/>
+              </a:rPr>
+              <a:t>Mostrar la lista de puntuaciones actualizada</a:t>
+            </a:r>
+          </a:p>
+          <a:p>
+            <a:pPr>
+              <a:lnSpc>
+                <a:spcPct val="90000"/>
+              </a:lnSpc>
+            </a:pPr>
+            <a:endParaRPr lang="en-US" sz="1100" dirty="0"/>
+          </a:p>
+        </p:txBody>
+      </p:sp>
+    </p:spTree>
+    <p:extLst>
+      <p:ext uri="{BB962C8B-B14F-4D97-AF65-F5344CB8AC3E}">
+        <p14:creationId xmlns:p14="http://schemas.microsoft.com/office/powerpoint/2010/main" val="1373925038"/>
       </p:ext>
     </p:extLst>
   </p:cSld>

</xml_diff>